<commit_message>
Added Betting Strategy Slides and Pics
</commit_message>
<xml_diff>
--- a/Final Project Presentation.pptx
+++ b/Final Project Presentation.pptx
@@ -9,16 +9,19 @@
     <p:sldId id="263" r:id="rId3"/>
     <p:sldId id="266" r:id="rId4"/>
     <p:sldId id="265" r:id="rId5"/>
-    <p:sldId id="267" r:id="rId6"/>
-    <p:sldId id="257" r:id="rId7"/>
-    <p:sldId id="260" r:id="rId8"/>
-    <p:sldId id="259" r:id="rId9"/>
-    <p:sldId id="258" r:id="rId10"/>
-    <p:sldId id="268" r:id="rId11"/>
-    <p:sldId id="261" r:id="rId12"/>
-    <p:sldId id="264" r:id="rId13"/>
-    <p:sldId id="269" r:id="rId14"/>
-    <p:sldId id="262" r:id="rId15"/>
+    <p:sldId id="272" r:id="rId6"/>
+    <p:sldId id="267" r:id="rId7"/>
+    <p:sldId id="257" r:id="rId8"/>
+    <p:sldId id="260" r:id="rId9"/>
+    <p:sldId id="259" r:id="rId10"/>
+    <p:sldId id="258" r:id="rId11"/>
+    <p:sldId id="268" r:id="rId12"/>
+    <p:sldId id="261" r:id="rId13"/>
+    <p:sldId id="264" r:id="rId14"/>
+    <p:sldId id="269" r:id="rId15"/>
+    <p:sldId id="270" r:id="rId16"/>
+    <p:sldId id="271" r:id="rId17"/>
+    <p:sldId id="262" r:id="rId18"/>
   </p:sldIdLst>
   <p:sldSz cx="12192000" cy="6858000"/>
   <p:notesSz cx="6858000" cy="9144000"/>
@@ -4160,10 +4163,10 @@
       </p:grpSpPr>
       <p:sp>
         <p:nvSpPr>
-          <p:cNvPr id="4" name="Title 3">
-            <a:extLst>
-              <a:ext uri="{FF2B5EF4-FFF2-40B4-BE49-F238E27FC236}">
-                <a16:creationId xmlns:a16="http://schemas.microsoft.com/office/drawing/2014/main" id="{73DC8293-01D3-4666-B5F4-203AAF10C800}"/>
+          <p:cNvPr id="2" name="Title 1">
+            <a:extLst>
+              <a:ext uri="{FF2B5EF4-FFF2-40B4-BE49-F238E27FC236}">
+                <a16:creationId xmlns:a16="http://schemas.microsoft.com/office/drawing/2014/main" id="{E3662930-9BBA-45FC-8CAA-101904758C83}"/>
               </a:ext>
             </a:extLst>
           </p:cNvPr>
@@ -4176,12 +4179,83 @@
         </p:nvSpPr>
         <p:spPr/>
         <p:txBody>
+          <a:bodyPr>
+            <a:normAutofit fontScale="90000"/>
+          </a:bodyPr>
+          <a:lstStyle/>
+          <a:p>
+            <a:r>
+              <a:rPr lang="en-US" dirty="0"/>
+              <a:t>Average profit expectation per odds</a:t>
+            </a:r>
+          </a:p>
+        </p:txBody>
+      </p:sp>
+      <p:pic>
+        <p:nvPicPr>
+          <p:cNvPr id="6" name="Content Placeholder 5">
+            <a:extLst>
+              <a:ext uri="{FF2B5EF4-FFF2-40B4-BE49-F238E27FC236}">
+                <a16:creationId xmlns:a16="http://schemas.microsoft.com/office/drawing/2014/main" id="{B1ED3869-0B9F-4A59-882D-74E44357D884}"/>
+              </a:ext>
+            </a:extLst>
+          </p:cNvPr>
+          <p:cNvPicPr>
+            <a:picLocks noGrp="1" noChangeAspect="1"/>
+          </p:cNvPicPr>
+          <p:nvPr>
+            <p:ph idx="1"/>
+          </p:nvPr>
+        </p:nvPicPr>
+        <p:blipFill>
+          <a:blip r:embed="rId2">
+            <a:extLst>
+              <a:ext uri="{28A0092B-C50C-407E-A947-70E740481C1C}">
+                <a14:useLocalDpi xmlns:a14="http://schemas.microsoft.com/office/drawing/2010/main" val="0"/>
+              </a:ext>
+            </a:extLst>
+          </a:blip>
+          <a:stretch>
+            <a:fillRect/>
+          </a:stretch>
+        </p:blipFill>
+        <p:spPr>
+          <a:xfrm>
+            <a:off x="5648325" y="1661648"/>
+            <a:ext cx="5707063" cy="3525178"/>
+          </a:xfrm>
+        </p:spPr>
+      </p:pic>
+      <p:sp>
+        <p:nvSpPr>
+          <p:cNvPr id="4" name="Text Placeholder 3">
+            <a:extLst>
+              <a:ext uri="{FF2B5EF4-FFF2-40B4-BE49-F238E27FC236}">
+                <a16:creationId xmlns:a16="http://schemas.microsoft.com/office/drawing/2014/main" id="{4A9B8F02-AD08-4361-8963-D05E50F12FB5}"/>
+              </a:ext>
+            </a:extLst>
+          </p:cNvPr>
+          <p:cNvSpPr>
+            <a:spLocks noGrp="1"/>
+          </p:cNvSpPr>
+          <p:nvPr>
+            <p:ph type="body" sz="half" idx="2"/>
+          </p:nvPr>
+        </p:nvSpPr>
+        <p:spPr/>
+        <p:txBody>
           <a:bodyPr/>
           <a:lstStyle/>
           <a:p>
             <a:r>
               <a:rPr lang="en-US" dirty="0"/>
-              <a:t>Other conditions to consider for selecting your winning horse</a:t>
+              <a:t>Better the odds will typically provide a higher probability of profit.</a:t>
+            </a:r>
+          </a:p>
+          <a:p>
+            <a:r>
+              <a:rPr lang="en-US" dirty="0"/>
+              <a:t>Higher profit on average for lower odds, but lower probability of winning</a:t>
             </a:r>
           </a:p>
         </p:txBody>
@@ -4189,7 +4263,7 @@
     </p:spTree>
     <p:extLst>
       <p:ext uri="{BB962C8B-B14F-4D97-AF65-F5344CB8AC3E}">
-        <p14:creationId xmlns:p14="http://schemas.microsoft.com/office/powerpoint/2010/main" val="1256604457"/>
+        <p14:creationId xmlns:p14="http://schemas.microsoft.com/office/powerpoint/2010/main" val="3241397502"/>
       </p:ext>
     </p:extLst>
   </p:cSld>
@@ -4218,6 +4292,64 @@
       </p:grpSpPr>
       <p:sp>
         <p:nvSpPr>
+          <p:cNvPr id="4" name="Title 3">
+            <a:extLst>
+              <a:ext uri="{FF2B5EF4-FFF2-40B4-BE49-F238E27FC236}">
+                <a16:creationId xmlns:a16="http://schemas.microsoft.com/office/drawing/2014/main" id="{73DC8293-01D3-4666-B5F4-203AAF10C800}"/>
+              </a:ext>
+            </a:extLst>
+          </p:cNvPr>
+          <p:cNvSpPr>
+            <a:spLocks noGrp="1"/>
+          </p:cNvSpPr>
+          <p:nvPr>
+            <p:ph type="title"/>
+          </p:nvPr>
+        </p:nvSpPr>
+        <p:spPr/>
+        <p:txBody>
+          <a:bodyPr/>
+          <a:lstStyle/>
+          <a:p>
+            <a:r>
+              <a:rPr lang="en-US" dirty="0"/>
+              <a:t>Other conditions to consider for selecting your winning horse</a:t>
+            </a:r>
+          </a:p>
+        </p:txBody>
+      </p:sp>
+    </p:spTree>
+    <p:extLst>
+      <p:ext uri="{BB962C8B-B14F-4D97-AF65-F5344CB8AC3E}">
+        <p14:creationId xmlns:p14="http://schemas.microsoft.com/office/powerpoint/2010/main" val="1256604457"/>
+      </p:ext>
+    </p:extLst>
+  </p:cSld>
+  <p:clrMapOvr>
+    <a:masterClrMapping/>
+  </p:clrMapOvr>
+</p:sld>
+</file>
+
+<file path=ppt/slides/slide12.xml><?xml version="1.0" encoding="utf-8"?>
+<p:sld xmlns:a="http://schemas.openxmlformats.org/drawingml/2006/main" xmlns:r="http://schemas.openxmlformats.org/officeDocument/2006/relationships" xmlns:p="http://schemas.openxmlformats.org/presentationml/2006/main">
+  <p:cSld>
+    <p:spTree>
+      <p:nvGrpSpPr>
+        <p:cNvPr id="1" name=""/>
+        <p:cNvGrpSpPr/>
+        <p:nvPr/>
+      </p:nvGrpSpPr>
+      <p:grpSpPr>
+        <a:xfrm>
+          <a:off x="0" y="0"/>
+          <a:ext cx="0" cy="0"/>
+          <a:chOff x="0" y="0"/>
+          <a:chExt cx="0" cy="0"/>
+        </a:xfrm>
+      </p:grpSpPr>
+      <p:sp>
+        <p:nvSpPr>
           <p:cNvPr id="2" name="Title 1">
             <a:extLst>
               <a:ext uri="{FF2B5EF4-FFF2-40B4-BE49-F238E27FC236}">
@@ -4239,7 +4371,7 @@
           <a:p>
             <a:r>
               <a:rPr lang="en-US" dirty="0"/>
-              <a:t>weather and track conditions can affect horse race outcomes</a:t>
+              <a:t>weather and track conditions can help underdogs</a:t>
             </a:r>
           </a:p>
         </p:txBody>
@@ -4536,204 +4668,6 @@
 </p:sld>
 </file>
 
-<file path=ppt/slides/slide12.xml><?xml version="1.0" encoding="utf-8"?>
-<p:sld xmlns:a="http://schemas.openxmlformats.org/drawingml/2006/main" xmlns:r="http://schemas.openxmlformats.org/officeDocument/2006/relationships" xmlns:p="http://schemas.openxmlformats.org/presentationml/2006/main">
-  <p:cSld>
-    <p:spTree>
-      <p:nvGrpSpPr>
-        <p:cNvPr id="1" name=""/>
-        <p:cNvGrpSpPr/>
-        <p:nvPr/>
-      </p:nvGrpSpPr>
-      <p:grpSpPr>
-        <a:xfrm>
-          <a:off x="0" y="0"/>
-          <a:ext cx="0" cy="0"/>
-          <a:chOff x="0" y="0"/>
-          <a:chExt cx="0" cy="0"/>
-        </a:xfrm>
-      </p:grpSpPr>
-      <p:sp>
-        <p:nvSpPr>
-          <p:cNvPr id="2" name="Title 1">
-            <a:extLst>
-              <a:ext uri="{FF2B5EF4-FFF2-40B4-BE49-F238E27FC236}">
-                <a16:creationId xmlns:a16="http://schemas.microsoft.com/office/drawing/2014/main" id="{E83DABE2-99B6-417A-91C7-ADC902E18D49}"/>
-              </a:ext>
-            </a:extLst>
-          </p:cNvPr>
-          <p:cNvSpPr>
-            <a:spLocks noGrp="1"/>
-          </p:cNvSpPr>
-          <p:nvPr>
-            <p:ph type="title"/>
-          </p:nvPr>
-        </p:nvSpPr>
-        <p:spPr/>
-        <p:txBody>
-          <a:bodyPr/>
-          <a:lstStyle/>
-          <a:p>
-            <a:r>
-              <a:rPr lang="en-US" dirty="0"/>
-              <a:t>Winning horses typically have a winning team</a:t>
-            </a:r>
-          </a:p>
-        </p:txBody>
-      </p:sp>
-      <p:pic>
-        <p:nvPicPr>
-          <p:cNvPr id="6" name="Content Placeholder 5">
-            <a:extLst>
-              <a:ext uri="{FF2B5EF4-FFF2-40B4-BE49-F238E27FC236}">
-                <a16:creationId xmlns:a16="http://schemas.microsoft.com/office/drawing/2014/main" id="{F88972CF-99CD-48CC-9D1A-B069062A5C39}"/>
-              </a:ext>
-            </a:extLst>
-          </p:cNvPr>
-          <p:cNvPicPr>
-            <a:picLocks noGrp="1" noChangeAspect="1"/>
-          </p:cNvPicPr>
-          <p:nvPr>
-            <p:ph sz="half" idx="1"/>
-          </p:nvPr>
-        </p:nvPicPr>
-        <p:blipFill>
-          <a:blip r:embed="rId2">
-            <a:extLst>
-              <a:ext uri="{28A0092B-C50C-407E-A947-70E740481C1C}">
-                <a14:useLocalDpi xmlns:a14="http://schemas.microsoft.com/office/drawing/2010/main" val="0"/>
-              </a:ext>
-            </a:extLst>
-          </a:blip>
-          <a:stretch>
-            <a:fillRect/>
-          </a:stretch>
-        </p:blipFill>
-        <p:spPr>
-          <a:xfrm>
-            <a:off x="1044575" y="2373111"/>
-            <a:ext cx="4975225" cy="3426229"/>
-          </a:xfrm>
-        </p:spPr>
-      </p:pic>
-      <p:pic>
-        <p:nvPicPr>
-          <p:cNvPr id="8" name="Content Placeholder 7">
-            <a:extLst>
-              <a:ext uri="{FF2B5EF4-FFF2-40B4-BE49-F238E27FC236}">
-                <a16:creationId xmlns:a16="http://schemas.microsoft.com/office/drawing/2014/main" id="{A26624BB-0945-478B-AE44-9652BCBDD058}"/>
-              </a:ext>
-            </a:extLst>
-          </p:cNvPr>
-          <p:cNvPicPr>
-            <a:picLocks noGrp="1" noChangeAspect="1"/>
-          </p:cNvPicPr>
-          <p:nvPr>
-            <p:ph sz="half" idx="2"/>
-          </p:nvPr>
-        </p:nvPicPr>
-        <p:blipFill>
-          <a:blip r:embed="rId3">
-            <a:extLst>
-              <a:ext uri="{28A0092B-C50C-407E-A947-70E740481C1C}">
-                <a14:useLocalDpi xmlns:a14="http://schemas.microsoft.com/office/drawing/2010/main" val="0"/>
-              </a:ext>
-            </a:extLst>
-          </a:blip>
-          <a:stretch>
-            <a:fillRect/>
-          </a:stretch>
-        </p:blipFill>
-        <p:spPr>
-          <a:xfrm>
-            <a:off x="6172200" y="2248158"/>
-            <a:ext cx="5181600" cy="3676135"/>
-          </a:xfrm>
-        </p:spPr>
-      </p:pic>
-      <p:sp>
-        <p:nvSpPr>
-          <p:cNvPr id="9" name="TextBox 8">
-            <a:extLst>
-              <a:ext uri="{FF2B5EF4-FFF2-40B4-BE49-F238E27FC236}">
-                <a16:creationId xmlns:a16="http://schemas.microsoft.com/office/drawing/2014/main" id="{D743AED1-85E3-4D81-BD0F-9D5174281F0A}"/>
-              </a:ext>
-            </a:extLst>
-          </p:cNvPr>
-          <p:cNvSpPr txBox="1"/>
-          <p:nvPr/>
-        </p:nvSpPr>
-        <p:spPr>
-          <a:xfrm>
-            <a:off x="2740595" y="4044333"/>
-            <a:ext cx="2417684" cy="461665"/>
-          </a:xfrm>
-          <a:prstGeom prst="rect">
-            <a:avLst/>
-          </a:prstGeom>
-          <a:noFill/>
-        </p:spPr>
-        <p:txBody>
-          <a:bodyPr wrap="square" rtlCol="0">
-            <a:spAutoFit/>
-          </a:bodyPr>
-          <a:lstStyle/>
-          <a:p>
-            <a:r>
-              <a:rPr lang="en-US" sz="2400" b="1" dirty="0"/>
-              <a:t>Wins by Jockey</a:t>
-            </a:r>
-          </a:p>
-        </p:txBody>
-      </p:sp>
-      <p:sp>
-        <p:nvSpPr>
-          <p:cNvPr id="10" name="TextBox 9">
-            <a:extLst>
-              <a:ext uri="{FF2B5EF4-FFF2-40B4-BE49-F238E27FC236}">
-                <a16:creationId xmlns:a16="http://schemas.microsoft.com/office/drawing/2014/main" id="{E3F71AF3-298D-46EB-B0ED-E599BEE4E6DB}"/>
-              </a:ext>
-            </a:extLst>
-          </p:cNvPr>
-          <p:cNvSpPr txBox="1"/>
-          <p:nvPr/>
-        </p:nvSpPr>
-        <p:spPr>
-          <a:xfrm>
-            <a:off x="7278564" y="4086225"/>
-            <a:ext cx="2417684" cy="461665"/>
-          </a:xfrm>
-          <a:prstGeom prst="rect">
-            <a:avLst/>
-          </a:prstGeom>
-          <a:noFill/>
-        </p:spPr>
-        <p:txBody>
-          <a:bodyPr wrap="square" rtlCol="0">
-            <a:spAutoFit/>
-          </a:bodyPr>
-          <a:lstStyle/>
-          <a:p>
-            <a:r>
-              <a:rPr lang="en-US" sz="2400" b="1" dirty="0"/>
-              <a:t>Wins by Trainer</a:t>
-            </a:r>
-          </a:p>
-        </p:txBody>
-      </p:sp>
-    </p:spTree>
-    <p:extLst>
-      <p:ext uri="{BB962C8B-B14F-4D97-AF65-F5344CB8AC3E}">
-        <p14:creationId xmlns:p14="http://schemas.microsoft.com/office/powerpoint/2010/main" val="1171369740"/>
-      </p:ext>
-    </p:extLst>
-  </p:cSld>
-  <p:clrMapOvr>
-    <a:masterClrMapping/>
-  </p:clrMapOvr>
-</p:sld>
-</file>
-
 <file path=ppt/slides/slide13.xml><?xml version="1.0" encoding="utf-8"?>
 <p:sld xmlns:a="http://schemas.openxmlformats.org/drawingml/2006/main" xmlns:r="http://schemas.openxmlformats.org/officeDocument/2006/relationships" xmlns:p="http://schemas.openxmlformats.org/presentationml/2006/main">
   <p:cSld>
@@ -4756,6 +4690,204 @@
           <p:cNvPr id="2" name="Title 1">
             <a:extLst>
               <a:ext uri="{FF2B5EF4-FFF2-40B4-BE49-F238E27FC236}">
+                <a16:creationId xmlns:a16="http://schemas.microsoft.com/office/drawing/2014/main" id="{E83DABE2-99B6-417A-91C7-ADC902E18D49}"/>
+              </a:ext>
+            </a:extLst>
+          </p:cNvPr>
+          <p:cNvSpPr>
+            <a:spLocks noGrp="1"/>
+          </p:cNvSpPr>
+          <p:nvPr>
+            <p:ph type="title"/>
+          </p:nvPr>
+        </p:nvSpPr>
+        <p:spPr/>
+        <p:txBody>
+          <a:bodyPr/>
+          <a:lstStyle/>
+          <a:p>
+            <a:r>
+              <a:rPr lang="en-US" dirty="0"/>
+              <a:t>Winning horses typically have a winning team</a:t>
+            </a:r>
+          </a:p>
+        </p:txBody>
+      </p:sp>
+      <p:pic>
+        <p:nvPicPr>
+          <p:cNvPr id="6" name="Content Placeholder 5">
+            <a:extLst>
+              <a:ext uri="{FF2B5EF4-FFF2-40B4-BE49-F238E27FC236}">
+                <a16:creationId xmlns:a16="http://schemas.microsoft.com/office/drawing/2014/main" id="{F88972CF-99CD-48CC-9D1A-B069062A5C39}"/>
+              </a:ext>
+            </a:extLst>
+          </p:cNvPr>
+          <p:cNvPicPr>
+            <a:picLocks noGrp="1" noChangeAspect="1"/>
+          </p:cNvPicPr>
+          <p:nvPr>
+            <p:ph sz="half" idx="1"/>
+          </p:nvPr>
+        </p:nvPicPr>
+        <p:blipFill>
+          <a:blip r:embed="rId2">
+            <a:extLst>
+              <a:ext uri="{28A0092B-C50C-407E-A947-70E740481C1C}">
+                <a14:useLocalDpi xmlns:a14="http://schemas.microsoft.com/office/drawing/2010/main" val="0"/>
+              </a:ext>
+            </a:extLst>
+          </a:blip>
+          <a:stretch>
+            <a:fillRect/>
+          </a:stretch>
+        </p:blipFill>
+        <p:spPr>
+          <a:xfrm>
+            <a:off x="1044575" y="2373111"/>
+            <a:ext cx="4975225" cy="3426229"/>
+          </a:xfrm>
+        </p:spPr>
+      </p:pic>
+      <p:pic>
+        <p:nvPicPr>
+          <p:cNvPr id="8" name="Content Placeholder 7">
+            <a:extLst>
+              <a:ext uri="{FF2B5EF4-FFF2-40B4-BE49-F238E27FC236}">
+                <a16:creationId xmlns:a16="http://schemas.microsoft.com/office/drawing/2014/main" id="{A26624BB-0945-478B-AE44-9652BCBDD058}"/>
+              </a:ext>
+            </a:extLst>
+          </p:cNvPr>
+          <p:cNvPicPr>
+            <a:picLocks noGrp="1" noChangeAspect="1"/>
+          </p:cNvPicPr>
+          <p:nvPr>
+            <p:ph sz="half" idx="2"/>
+          </p:nvPr>
+        </p:nvPicPr>
+        <p:blipFill>
+          <a:blip r:embed="rId3">
+            <a:extLst>
+              <a:ext uri="{28A0092B-C50C-407E-A947-70E740481C1C}">
+                <a14:useLocalDpi xmlns:a14="http://schemas.microsoft.com/office/drawing/2010/main" val="0"/>
+              </a:ext>
+            </a:extLst>
+          </a:blip>
+          <a:stretch>
+            <a:fillRect/>
+          </a:stretch>
+        </p:blipFill>
+        <p:spPr>
+          <a:xfrm>
+            <a:off x="6172200" y="2248158"/>
+            <a:ext cx="5181600" cy="3676135"/>
+          </a:xfrm>
+        </p:spPr>
+      </p:pic>
+      <p:sp>
+        <p:nvSpPr>
+          <p:cNvPr id="9" name="TextBox 8">
+            <a:extLst>
+              <a:ext uri="{FF2B5EF4-FFF2-40B4-BE49-F238E27FC236}">
+                <a16:creationId xmlns:a16="http://schemas.microsoft.com/office/drawing/2014/main" id="{D743AED1-85E3-4D81-BD0F-9D5174281F0A}"/>
+              </a:ext>
+            </a:extLst>
+          </p:cNvPr>
+          <p:cNvSpPr txBox="1"/>
+          <p:nvPr/>
+        </p:nvSpPr>
+        <p:spPr>
+          <a:xfrm>
+            <a:off x="2740595" y="4044333"/>
+            <a:ext cx="2417684" cy="461665"/>
+          </a:xfrm>
+          <a:prstGeom prst="rect">
+            <a:avLst/>
+          </a:prstGeom>
+          <a:noFill/>
+        </p:spPr>
+        <p:txBody>
+          <a:bodyPr wrap="square" rtlCol="0">
+            <a:spAutoFit/>
+          </a:bodyPr>
+          <a:lstStyle/>
+          <a:p>
+            <a:r>
+              <a:rPr lang="en-US" sz="2400" b="1" dirty="0"/>
+              <a:t>Wins by Jockey</a:t>
+            </a:r>
+          </a:p>
+        </p:txBody>
+      </p:sp>
+      <p:sp>
+        <p:nvSpPr>
+          <p:cNvPr id="10" name="TextBox 9">
+            <a:extLst>
+              <a:ext uri="{FF2B5EF4-FFF2-40B4-BE49-F238E27FC236}">
+                <a16:creationId xmlns:a16="http://schemas.microsoft.com/office/drawing/2014/main" id="{E3F71AF3-298D-46EB-B0ED-E599BEE4E6DB}"/>
+              </a:ext>
+            </a:extLst>
+          </p:cNvPr>
+          <p:cNvSpPr txBox="1"/>
+          <p:nvPr/>
+        </p:nvSpPr>
+        <p:spPr>
+          <a:xfrm>
+            <a:off x="7278564" y="4086225"/>
+            <a:ext cx="2417684" cy="461665"/>
+          </a:xfrm>
+          <a:prstGeom prst="rect">
+            <a:avLst/>
+          </a:prstGeom>
+          <a:noFill/>
+        </p:spPr>
+        <p:txBody>
+          <a:bodyPr wrap="square" rtlCol="0">
+            <a:spAutoFit/>
+          </a:bodyPr>
+          <a:lstStyle/>
+          <a:p>
+            <a:r>
+              <a:rPr lang="en-US" sz="2400" b="1" dirty="0"/>
+              <a:t>Wins by Trainer</a:t>
+            </a:r>
+          </a:p>
+        </p:txBody>
+      </p:sp>
+    </p:spTree>
+    <p:extLst>
+      <p:ext uri="{BB962C8B-B14F-4D97-AF65-F5344CB8AC3E}">
+        <p14:creationId xmlns:p14="http://schemas.microsoft.com/office/powerpoint/2010/main" val="1171369740"/>
+      </p:ext>
+    </p:extLst>
+  </p:cSld>
+  <p:clrMapOvr>
+    <a:masterClrMapping/>
+  </p:clrMapOvr>
+</p:sld>
+</file>
+
+<file path=ppt/slides/slide14.xml><?xml version="1.0" encoding="utf-8"?>
+<p:sld xmlns:a="http://schemas.openxmlformats.org/drawingml/2006/main" xmlns:r="http://schemas.openxmlformats.org/officeDocument/2006/relationships" xmlns:p="http://schemas.openxmlformats.org/presentationml/2006/main">
+  <p:cSld>
+    <p:spTree>
+      <p:nvGrpSpPr>
+        <p:cNvPr id="1" name=""/>
+        <p:cNvGrpSpPr/>
+        <p:nvPr/>
+      </p:nvGrpSpPr>
+      <p:grpSpPr>
+        <a:xfrm>
+          <a:off x="0" y="0"/>
+          <a:ext cx="0" cy="0"/>
+          <a:chOff x="0" y="0"/>
+          <a:chExt cx="0" cy="0"/>
+        </a:xfrm>
+      </p:grpSpPr>
+      <p:sp>
+        <p:nvSpPr>
+          <p:cNvPr id="2" name="Title 1">
+            <a:extLst>
+              <a:ext uri="{FF2B5EF4-FFF2-40B4-BE49-F238E27FC236}">
                 <a16:creationId xmlns:a16="http://schemas.microsoft.com/office/drawing/2014/main" id="{891286F7-17FB-40CB-A7FE-B9A485743F40}"/>
               </a:ext>
             </a:extLst>
@@ -4792,7 +4924,512 @@
 </p:sld>
 </file>
 
-<file path=ppt/slides/slide14.xml><?xml version="1.0" encoding="utf-8"?>
+<file path=ppt/slides/slide15.xml><?xml version="1.0" encoding="utf-8"?>
+<p:sld xmlns:a="http://schemas.openxmlformats.org/drawingml/2006/main" xmlns:r="http://schemas.openxmlformats.org/officeDocument/2006/relationships" xmlns:p="http://schemas.openxmlformats.org/presentationml/2006/main">
+  <p:cSld>
+    <p:spTree>
+      <p:nvGrpSpPr>
+        <p:cNvPr id="1" name=""/>
+        <p:cNvGrpSpPr/>
+        <p:nvPr/>
+      </p:nvGrpSpPr>
+      <p:grpSpPr>
+        <a:xfrm>
+          <a:off x="0" y="0"/>
+          <a:ext cx="0" cy="0"/>
+          <a:chOff x="0" y="0"/>
+          <a:chExt cx="0" cy="0"/>
+        </a:xfrm>
+      </p:grpSpPr>
+      <p:sp>
+        <p:nvSpPr>
+          <p:cNvPr id="15" name="Title 14">
+            <a:extLst>
+              <a:ext uri="{FF2B5EF4-FFF2-40B4-BE49-F238E27FC236}">
+                <a16:creationId xmlns:a16="http://schemas.microsoft.com/office/drawing/2014/main" id="{D187C560-F79F-4712-9784-90D175A4790D}"/>
+              </a:ext>
+            </a:extLst>
+          </p:cNvPr>
+          <p:cNvSpPr>
+            <a:spLocks noGrp="1"/>
+          </p:cNvSpPr>
+          <p:nvPr>
+            <p:ph type="title"/>
+          </p:nvPr>
+        </p:nvSpPr>
+        <p:spPr/>
+        <p:txBody>
+          <a:bodyPr/>
+          <a:lstStyle/>
+          <a:p>
+            <a:r>
+              <a:rPr lang="en-US" dirty="0"/>
+              <a:t>Proportional betting</a:t>
+            </a:r>
+          </a:p>
+        </p:txBody>
+      </p:sp>
+      <p:pic>
+        <p:nvPicPr>
+          <p:cNvPr id="6" name="Content Placeholder 5">
+            <a:extLst>
+              <a:ext uri="{FF2B5EF4-FFF2-40B4-BE49-F238E27FC236}">
+                <a16:creationId xmlns:a16="http://schemas.microsoft.com/office/drawing/2014/main" id="{64A979BF-29F6-472B-8877-42508F4BE553}"/>
+              </a:ext>
+            </a:extLst>
+          </p:cNvPr>
+          <p:cNvPicPr>
+            <a:picLocks noGrp="1" noChangeAspect="1"/>
+          </p:cNvPicPr>
+          <p:nvPr>
+            <p:ph sz="half" idx="4294967295"/>
+          </p:nvPr>
+        </p:nvPicPr>
+        <p:blipFill>
+          <a:blip r:embed="rId2">
+            <a:extLst>
+              <a:ext uri="{28A0092B-C50C-407E-A947-70E740481C1C}">
+                <a14:useLocalDpi xmlns:a14="http://schemas.microsoft.com/office/drawing/2010/main" val="0"/>
+              </a:ext>
+            </a:extLst>
+          </a:blip>
+          <a:stretch>
+            <a:fillRect/>
+          </a:stretch>
+        </p:blipFill>
+        <p:spPr>
+          <a:xfrm>
+            <a:off x="566970" y="2135078"/>
+            <a:ext cx="5449131" cy="3395709"/>
+          </a:xfrm>
+          <a:ln>
+            <a:solidFill>
+              <a:schemeClr val="tx1"/>
+            </a:solidFill>
+          </a:ln>
+        </p:spPr>
+      </p:pic>
+      <p:pic>
+        <p:nvPicPr>
+          <p:cNvPr id="10" name="Picture 9">
+            <a:extLst>
+              <a:ext uri="{FF2B5EF4-FFF2-40B4-BE49-F238E27FC236}">
+                <a16:creationId xmlns:a16="http://schemas.microsoft.com/office/drawing/2014/main" id="{B068715E-051E-438B-9550-91A23DFEE83E}"/>
+              </a:ext>
+            </a:extLst>
+          </p:cNvPr>
+          <p:cNvPicPr>
+            <a:picLocks noChangeAspect="1"/>
+          </p:cNvPicPr>
+          <p:nvPr/>
+        </p:nvPicPr>
+        <p:blipFill>
+          <a:blip r:embed="rId3">
+            <a:extLst>
+              <a:ext uri="{28A0092B-C50C-407E-A947-70E740481C1C}">
+                <a14:useLocalDpi xmlns:a14="http://schemas.microsoft.com/office/drawing/2010/main" val="0"/>
+              </a:ext>
+            </a:extLst>
+          </a:blip>
+          <a:stretch>
+            <a:fillRect/>
+          </a:stretch>
+        </p:blipFill>
+        <p:spPr>
+          <a:xfrm>
+            <a:off x="6175901" y="2135078"/>
+            <a:ext cx="5453314" cy="3395708"/>
+          </a:xfrm>
+          <a:prstGeom prst="rect">
+            <a:avLst/>
+          </a:prstGeom>
+          <a:ln>
+            <a:solidFill>
+              <a:schemeClr val="tx1"/>
+            </a:solidFill>
+          </a:ln>
+        </p:spPr>
+      </p:pic>
+      <p:sp>
+        <p:nvSpPr>
+          <p:cNvPr id="16" name="TextBox 15">
+            <a:extLst>
+              <a:ext uri="{FF2B5EF4-FFF2-40B4-BE49-F238E27FC236}">
+                <a16:creationId xmlns:a16="http://schemas.microsoft.com/office/drawing/2014/main" id="{812620B1-EE7D-406D-8A4E-C4EFD336D1C1}"/>
+              </a:ext>
+            </a:extLst>
+          </p:cNvPr>
+          <p:cNvSpPr txBox="1"/>
+          <p:nvPr/>
+        </p:nvSpPr>
+        <p:spPr>
+          <a:xfrm>
+            <a:off x="566970" y="5605845"/>
+            <a:ext cx="2605998" cy="369332"/>
+          </a:xfrm>
+          <a:prstGeom prst="rect">
+            <a:avLst/>
+          </a:prstGeom>
+          <a:solidFill>
+            <a:schemeClr val="bg1"/>
+          </a:solidFill>
+        </p:spPr>
+        <p:txBody>
+          <a:bodyPr wrap="square" rtlCol="0">
+            <a:spAutoFit/>
+          </a:bodyPr>
+          <a:lstStyle/>
+          <a:p>
+            <a:r>
+              <a:rPr lang="en-US" dirty="0"/>
+              <a:t>Proportional Betting - Win</a:t>
+            </a:r>
+          </a:p>
+        </p:txBody>
+      </p:sp>
+      <p:sp>
+        <p:nvSpPr>
+          <p:cNvPr id="17" name="TextBox 16">
+            <a:extLst>
+              <a:ext uri="{FF2B5EF4-FFF2-40B4-BE49-F238E27FC236}">
+                <a16:creationId xmlns:a16="http://schemas.microsoft.com/office/drawing/2014/main" id="{5BD642A8-A767-454B-9C09-7726504B2CC4}"/>
+              </a:ext>
+            </a:extLst>
+          </p:cNvPr>
+          <p:cNvSpPr txBox="1"/>
+          <p:nvPr/>
+        </p:nvSpPr>
+        <p:spPr>
+          <a:xfrm>
+            <a:off x="6175901" y="5606942"/>
+            <a:ext cx="2605998" cy="369332"/>
+          </a:xfrm>
+          <a:prstGeom prst="rect">
+            <a:avLst/>
+          </a:prstGeom>
+          <a:solidFill>
+            <a:schemeClr val="bg1"/>
+          </a:solidFill>
+        </p:spPr>
+        <p:txBody>
+          <a:bodyPr wrap="square" rtlCol="0">
+            <a:spAutoFit/>
+          </a:bodyPr>
+          <a:lstStyle/>
+          <a:p>
+            <a:r>
+              <a:rPr lang="en-US" dirty="0"/>
+              <a:t>Proportional Betting - Lose</a:t>
+            </a:r>
+          </a:p>
+        </p:txBody>
+      </p:sp>
+    </p:spTree>
+    <p:extLst>
+      <p:ext uri="{BB962C8B-B14F-4D97-AF65-F5344CB8AC3E}">
+        <p14:creationId xmlns:p14="http://schemas.microsoft.com/office/powerpoint/2010/main" val="236971246"/>
+      </p:ext>
+    </p:extLst>
+  </p:cSld>
+  <p:clrMapOvr>
+    <a:masterClrMapping/>
+  </p:clrMapOvr>
+</p:sld>
+</file>
+
+<file path=ppt/slides/slide16.xml><?xml version="1.0" encoding="utf-8"?>
+<p:sld xmlns:a="http://schemas.openxmlformats.org/drawingml/2006/main" xmlns:r="http://schemas.openxmlformats.org/officeDocument/2006/relationships" xmlns:p="http://schemas.openxmlformats.org/presentationml/2006/main">
+  <p:cSld>
+    <p:spTree>
+      <p:nvGrpSpPr>
+        <p:cNvPr id="1" name=""/>
+        <p:cNvGrpSpPr/>
+        <p:nvPr/>
+      </p:nvGrpSpPr>
+      <p:grpSpPr>
+        <a:xfrm>
+          <a:off x="0" y="0"/>
+          <a:ext cx="0" cy="0"/>
+          <a:chOff x="0" y="0"/>
+          <a:chExt cx="0" cy="0"/>
+        </a:xfrm>
+      </p:grpSpPr>
+      <p:pic>
+        <p:nvPicPr>
+          <p:cNvPr id="4" name="Picture 3">
+            <a:extLst>
+              <a:ext uri="{FF2B5EF4-FFF2-40B4-BE49-F238E27FC236}">
+                <a16:creationId xmlns:a16="http://schemas.microsoft.com/office/drawing/2014/main" id="{6C2E8B90-9DAC-4033-92FB-F02A3BBB0A39}"/>
+              </a:ext>
+            </a:extLst>
+          </p:cNvPr>
+          <p:cNvPicPr>
+            <a:picLocks noChangeAspect="1"/>
+          </p:cNvPicPr>
+          <p:nvPr/>
+        </p:nvPicPr>
+        <p:blipFill>
+          <a:blip r:embed="rId2">
+            <a:extLst>
+              <a:ext uri="{28A0092B-C50C-407E-A947-70E740481C1C}">
+                <a14:useLocalDpi xmlns:a14="http://schemas.microsoft.com/office/drawing/2010/main" val="0"/>
+              </a:ext>
+            </a:extLst>
+          </a:blip>
+          <a:stretch>
+            <a:fillRect/>
+          </a:stretch>
+        </p:blipFill>
+        <p:spPr>
+          <a:xfrm>
+            <a:off x="365759" y="2008059"/>
+            <a:ext cx="5249319" cy="2794523"/>
+          </a:xfrm>
+          <a:prstGeom prst="rect">
+            <a:avLst/>
+          </a:prstGeom>
+          <a:ln>
+            <a:solidFill>
+              <a:schemeClr val="tx1"/>
+            </a:solidFill>
+          </a:ln>
+        </p:spPr>
+      </p:pic>
+      <p:pic>
+        <p:nvPicPr>
+          <p:cNvPr id="8" name="Picture 7">
+            <a:extLst>
+              <a:ext uri="{FF2B5EF4-FFF2-40B4-BE49-F238E27FC236}">
+                <a16:creationId xmlns:a16="http://schemas.microsoft.com/office/drawing/2014/main" id="{127EAFC8-2F06-4A65-9F1F-B01FEC6D8EF1}"/>
+              </a:ext>
+            </a:extLst>
+          </p:cNvPr>
+          <p:cNvPicPr>
+            <a:picLocks noChangeAspect="1"/>
+          </p:cNvPicPr>
+          <p:nvPr/>
+        </p:nvPicPr>
+        <p:blipFill>
+          <a:blip r:embed="rId3">
+            <a:extLst>
+              <a:ext uri="{28A0092B-C50C-407E-A947-70E740481C1C}">
+                <a14:useLocalDpi xmlns:a14="http://schemas.microsoft.com/office/drawing/2010/main" val="0"/>
+              </a:ext>
+            </a:extLst>
+          </a:blip>
+          <a:stretch>
+            <a:fillRect/>
+          </a:stretch>
+        </p:blipFill>
+        <p:spPr>
+          <a:xfrm>
+            <a:off x="3276988" y="3032186"/>
+            <a:ext cx="5199112" cy="2794523"/>
+          </a:xfrm>
+          <a:prstGeom prst="rect">
+            <a:avLst/>
+          </a:prstGeom>
+          <a:ln>
+            <a:solidFill>
+              <a:schemeClr val="tx1"/>
+            </a:solidFill>
+          </a:ln>
+        </p:spPr>
+      </p:pic>
+      <p:sp>
+        <p:nvSpPr>
+          <p:cNvPr id="2" name="Title 1">
+            <a:extLst>
+              <a:ext uri="{FF2B5EF4-FFF2-40B4-BE49-F238E27FC236}">
+                <a16:creationId xmlns:a16="http://schemas.microsoft.com/office/drawing/2014/main" id="{920369AA-1875-48F3-A67E-27DAC902349D}"/>
+              </a:ext>
+            </a:extLst>
+          </p:cNvPr>
+          <p:cNvSpPr>
+            <a:spLocks noGrp="1"/>
+          </p:cNvSpPr>
+          <p:nvPr>
+            <p:ph type="title"/>
+          </p:nvPr>
+        </p:nvSpPr>
+        <p:spPr/>
+        <p:txBody>
+          <a:bodyPr/>
+          <a:lstStyle/>
+          <a:p>
+            <a:r>
+              <a:rPr lang="en-US" dirty="0"/>
+              <a:t>Other strategies</a:t>
+            </a:r>
+          </a:p>
+        </p:txBody>
+      </p:sp>
+      <p:pic>
+        <p:nvPicPr>
+          <p:cNvPr id="6" name="Picture 5">
+            <a:extLst>
+              <a:ext uri="{FF2B5EF4-FFF2-40B4-BE49-F238E27FC236}">
+                <a16:creationId xmlns:a16="http://schemas.microsoft.com/office/drawing/2014/main" id="{23B1075B-EEFA-4F6B-AD52-D3245AEEFB38}"/>
+              </a:ext>
+            </a:extLst>
+          </p:cNvPr>
+          <p:cNvPicPr>
+            <a:picLocks noChangeAspect="1"/>
+          </p:cNvPicPr>
+          <p:nvPr/>
+        </p:nvPicPr>
+        <p:blipFill>
+          <a:blip r:embed="rId4">
+            <a:extLst>
+              <a:ext uri="{28A0092B-C50C-407E-A947-70E740481C1C}">
+                <a14:useLocalDpi xmlns:a14="http://schemas.microsoft.com/office/drawing/2010/main" val="0"/>
+              </a:ext>
+            </a:extLst>
+          </a:blip>
+          <a:stretch>
+            <a:fillRect/>
+          </a:stretch>
+        </p:blipFill>
+        <p:spPr>
+          <a:xfrm>
+            <a:off x="7168508" y="3405320"/>
+            <a:ext cx="4657733" cy="2891267"/>
+          </a:xfrm>
+          <a:prstGeom prst="rect">
+            <a:avLst/>
+          </a:prstGeom>
+          <a:ln>
+            <a:solidFill>
+              <a:schemeClr val="tx1"/>
+            </a:solidFill>
+          </a:ln>
+        </p:spPr>
+      </p:pic>
+      <p:sp>
+        <p:nvSpPr>
+          <p:cNvPr id="9" name="TextBox 8">
+            <a:extLst>
+              <a:ext uri="{FF2B5EF4-FFF2-40B4-BE49-F238E27FC236}">
+                <a16:creationId xmlns:a16="http://schemas.microsoft.com/office/drawing/2014/main" id="{FCCCECCF-996B-4904-AC9A-3946B62374B9}"/>
+              </a:ext>
+            </a:extLst>
+          </p:cNvPr>
+          <p:cNvSpPr txBox="1"/>
+          <p:nvPr/>
+        </p:nvSpPr>
+        <p:spPr>
+          <a:xfrm>
+            <a:off x="2441448" y="2176771"/>
+            <a:ext cx="1234440" cy="369332"/>
+          </a:xfrm>
+          <a:prstGeom prst="rect">
+            <a:avLst/>
+          </a:prstGeom>
+          <a:solidFill>
+            <a:schemeClr val="bg1"/>
+          </a:solidFill>
+        </p:spPr>
+        <p:txBody>
+          <a:bodyPr wrap="square" rtlCol="0">
+            <a:spAutoFit/>
+          </a:bodyPr>
+          <a:lstStyle/>
+          <a:p>
+            <a:r>
+              <a:rPr lang="en-US" dirty="0"/>
+              <a:t>Bet It All</a:t>
+            </a:r>
+          </a:p>
+        </p:txBody>
+      </p:sp>
+      <p:sp>
+        <p:nvSpPr>
+          <p:cNvPr id="10" name="TextBox 9">
+            <a:extLst>
+              <a:ext uri="{FF2B5EF4-FFF2-40B4-BE49-F238E27FC236}">
+                <a16:creationId xmlns:a16="http://schemas.microsoft.com/office/drawing/2014/main" id="{63A6165E-D89C-4DE8-AC73-FD6141F67467}"/>
+              </a:ext>
+            </a:extLst>
+          </p:cNvPr>
+          <p:cNvSpPr txBox="1"/>
+          <p:nvPr/>
+        </p:nvSpPr>
+        <p:spPr>
+          <a:xfrm>
+            <a:off x="4782312" y="3861621"/>
+            <a:ext cx="1417320" cy="369332"/>
+          </a:xfrm>
+          <a:prstGeom prst="rect">
+            <a:avLst/>
+          </a:prstGeom>
+          <a:solidFill>
+            <a:schemeClr val="bg1"/>
+          </a:solidFill>
+        </p:spPr>
+        <p:txBody>
+          <a:bodyPr wrap="square" rtlCol="0">
+            <a:spAutoFit/>
+          </a:bodyPr>
+          <a:lstStyle/>
+          <a:p>
+            <a:r>
+              <a:rPr lang="en-US" dirty="0"/>
+              <a:t>Fixed Amount</a:t>
+            </a:r>
+          </a:p>
+        </p:txBody>
+      </p:sp>
+      <p:sp>
+        <p:nvSpPr>
+          <p:cNvPr id="11" name="TextBox 10">
+            <a:extLst>
+              <a:ext uri="{FF2B5EF4-FFF2-40B4-BE49-F238E27FC236}">
+                <a16:creationId xmlns:a16="http://schemas.microsoft.com/office/drawing/2014/main" id="{ED1651E5-4567-442C-9F18-36ED4392189E}"/>
+              </a:ext>
+            </a:extLst>
+          </p:cNvPr>
+          <p:cNvSpPr txBox="1"/>
+          <p:nvPr/>
+        </p:nvSpPr>
+        <p:spPr>
+          <a:xfrm>
+            <a:off x="9268968" y="4468005"/>
+            <a:ext cx="1996440" cy="369332"/>
+          </a:xfrm>
+          <a:prstGeom prst="rect">
+            <a:avLst/>
+          </a:prstGeom>
+          <a:solidFill>
+            <a:schemeClr val="bg1"/>
+          </a:solidFill>
+        </p:spPr>
+        <p:txBody>
+          <a:bodyPr wrap="square" rtlCol="0">
+            <a:spAutoFit/>
+          </a:bodyPr>
+          <a:lstStyle/>
+          <a:p>
+            <a:r>
+              <a:rPr lang="en-US" dirty="0"/>
+              <a:t>Martingale System</a:t>
+            </a:r>
+          </a:p>
+        </p:txBody>
+      </p:sp>
+    </p:spTree>
+    <p:extLst>
+      <p:ext uri="{BB962C8B-B14F-4D97-AF65-F5344CB8AC3E}">
+        <p14:creationId xmlns:p14="http://schemas.microsoft.com/office/powerpoint/2010/main" val="3227032485"/>
+      </p:ext>
+    </p:extLst>
+  </p:cSld>
+  <p:clrMapOvr>
+    <a:masterClrMapping/>
+  </p:clrMapOvr>
+</p:sld>
+</file>
+
+<file path=ppt/slides/slide17.xml><?xml version="1.0" encoding="utf-8"?>
 <p:sld xmlns:a="http://schemas.openxmlformats.org/drawingml/2006/main" xmlns:r="http://schemas.openxmlformats.org/officeDocument/2006/relationships" xmlns:p="http://schemas.openxmlformats.org/presentationml/2006/main">
   <p:cSld>
     <p:spTree>
@@ -5312,10 +5949,10 @@
       </p:grpSpPr>
       <p:sp>
         <p:nvSpPr>
-          <p:cNvPr id="12" name="Title 11">
-            <a:extLst>
-              <a:ext uri="{FF2B5EF4-FFF2-40B4-BE49-F238E27FC236}">
-                <a16:creationId xmlns:a16="http://schemas.microsoft.com/office/drawing/2014/main" id="{4EC682AA-8239-4D00-81A2-C2CE23811693}"/>
+          <p:cNvPr id="2" name="Title 1">
+            <a:extLst>
+              <a:ext uri="{FF2B5EF4-FFF2-40B4-BE49-F238E27FC236}">
+                <a16:creationId xmlns:a16="http://schemas.microsoft.com/office/drawing/2014/main" id="{77B4B8E6-B2A7-4CEE-AE27-E2876C0FDC59}"/>
               </a:ext>
             </a:extLst>
           </p:cNvPr>
@@ -5333,50 +5970,105 @@
           <a:p>
             <a:r>
               <a:rPr lang="en-US" dirty="0"/>
-              <a:t>Estimate profit using backend machine model</a:t>
+              <a:t>Betting strategy analysis</a:t>
             </a:r>
           </a:p>
         </p:txBody>
       </p:sp>
       <p:pic>
         <p:nvPicPr>
-          <p:cNvPr id="11" name="Content Placeholder 10">
-            <a:extLst>
-              <a:ext uri="{FF2B5EF4-FFF2-40B4-BE49-F238E27FC236}">
-                <a16:creationId xmlns:a16="http://schemas.microsoft.com/office/drawing/2014/main" id="{4381AC4E-8209-4361-B098-39C700E6E44E}"/>
+          <p:cNvPr id="4" name="Picture 3">
+            <a:extLst>
+              <a:ext uri="{FF2B5EF4-FFF2-40B4-BE49-F238E27FC236}">
+                <a16:creationId xmlns:a16="http://schemas.microsoft.com/office/drawing/2014/main" id="{A5516823-73B3-4C69-ABB2-7E66F60E5532}"/>
               </a:ext>
             </a:extLst>
           </p:cNvPr>
           <p:cNvPicPr>
-            <a:picLocks noGrp="1" noChangeAspect="1"/>
+            <a:picLocks noChangeAspect="1"/>
           </p:cNvPicPr>
-          <p:nvPr>
-            <p:ph idx="1"/>
-          </p:nvPr>
+          <p:nvPr/>
         </p:nvPicPr>
         <p:blipFill>
-          <a:blip r:embed="rId2">
-            <a:extLst>
-              <a:ext uri="{28A0092B-C50C-407E-A947-70E740481C1C}">
-                <a14:useLocalDpi xmlns:a14="http://schemas.microsoft.com/office/drawing/2010/main" val="0"/>
-              </a:ext>
-            </a:extLst>
-          </a:blip>
+          <a:blip r:embed="rId2"/>
           <a:stretch>
             <a:fillRect/>
           </a:stretch>
         </p:blipFill>
         <p:spPr>
           <a:xfrm>
-            <a:off x="2487448" y="2114550"/>
-            <a:ext cx="8009266" cy="3956050"/>
-          </a:xfrm>
+            <a:off x="1189608" y="1887617"/>
+            <a:ext cx="4945849" cy="2782040"/>
+          </a:xfrm>
+          <a:prstGeom prst="rect">
+            <a:avLst/>
+          </a:prstGeom>
+        </p:spPr>
+      </p:pic>
+      <p:pic>
+        <p:nvPicPr>
+          <p:cNvPr id="6" name="Picture 5">
+            <a:extLst>
+              <a:ext uri="{FF2B5EF4-FFF2-40B4-BE49-F238E27FC236}">
+                <a16:creationId xmlns:a16="http://schemas.microsoft.com/office/drawing/2014/main" id="{E9C149D2-2D6A-4D10-B7D6-99A6D6DA4072}"/>
+              </a:ext>
+            </a:extLst>
+          </p:cNvPr>
+          <p:cNvPicPr>
+            <a:picLocks noChangeAspect="1"/>
+          </p:cNvPicPr>
+          <p:nvPr/>
+        </p:nvPicPr>
+        <p:blipFill>
+          <a:blip r:embed="rId3"/>
+          <a:stretch>
+            <a:fillRect/>
+          </a:stretch>
+        </p:blipFill>
+        <p:spPr>
+          <a:xfrm>
+            <a:off x="3409025" y="2588954"/>
+            <a:ext cx="4945848" cy="2782040"/>
+          </a:xfrm>
+          <a:prstGeom prst="rect">
+            <a:avLst/>
+          </a:prstGeom>
+        </p:spPr>
+      </p:pic>
+      <p:pic>
+        <p:nvPicPr>
+          <p:cNvPr id="8" name="Picture 7">
+            <a:extLst>
+              <a:ext uri="{FF2B5EF4-FFF2-40B4-BE49-F238E27FC236}">
+                <a16:creationId xmlns:a16="http://schemas.microsoft.com/office/drawing/2014/main" id="{BE21D164-E395-4DA0-9B7A-FD3C1A1D42A2}"/>
+              </a:ext>
+            </a:extLst>
+          </p:cNvPr>
+          <p:cNvPicPr>
+            <a:picLocks noChangeAspect="1"/>
+          </p:cNvPicPr>
+          <p:nvPr/>
+        </p:nvPicPr>
+        <p:blipFill>
+          <a:blip r:embed="rId4"/>
+          <a:stretch>
+            <a:fillRect/>
+          </a:stretch>
+        </p:blipFill>
+        <p:spPr>
+          <a:xfrm>
+            <a:off x="6717437" y="3442830"/>
+            <a:ext cx="4945848" cy="2782040"/>
+          </a:xfrm>
+          <a:prstGeom prst="rect">
+            <a:avLst/>
+          </a:prstGeom>
         </p:spPr>
       </p:pic>
     </p:spTree>
     <p:extLst>
       <p:ext uri="{BB962C8B-B14F-4D97-AF65-F5344CB8AC3E}">
-        <p14:creationId xmlns:p14="http://schemas.microsoft.com/office/powerpoint/2010/main" val="3245994239"/>
+        <p14:creationId xmlns:p14="http://schemas.microsoft.com/office/powerpoint/2010/main" val="1701615640"/>
       </p:ext>
     </p:extLst>
   </p:cSld>
@@ -5405,10 +6097,10 @@
       </p:grpSpPr>
       <p:sp>
         <p:nvSpPr>
-          <p:cNvPr id="2" name="Title 1">
-            <a:extLst>
-              <a:ext uri="{FF2B5EF4-FFF2-40B4-BE49-F238E27FC236}">
-                <a16:creationId xmlns:a16="http://schemas.microsoft.com/office/drawing/2014/main" id="{BAF500A8-7530-4EF8-A30C-F5403EA0F42A}"/>
+          <p:cNvPr id="12" name="Title 11">
+            <a:extLst>
+              <a:ext uri="{FF2B5EF4-FFF2-40B4-BE49-F238E27FC236}">
+                <a16:creationId xmlns:a16="http://schemas.microsoft.com/office/drawing/2014/main" id="{4EC682AA-8239-4D00-81A2-C2CE23811693}"/>
               </a:ext>
             </a:extLst>
           </p:cNvPr>
@@ -5426,91 +6118,50 @@
           <a:p>
             <a:r>
               <a:rPr lang="en-US" dirty="0"/>
-              <a:t>approach</a:t>
-            </a:r>
-          </a:p>
-        </p:txBody>
-      </p:sp>
-      <p:sp>
-        <p:nvSpPr>
-          <p:cNvPr id="3" name="Content Placeholder 2">
-            <a:extLst>
-              <a:ext uri="{FF2B5EF4-FFF2-40B4-BE49-F238E27FC236}">
-                <a16:creationId xmlns:a16="http://schemas.microsoft.com/office/drawing/2014/main" id="{7F6C3408-8B60-4991-8A50-E21A6DA88B59}"/>
-              </a:ext>
-            </a:extLst>
-          </p:cNvPr>
-          <p:cNvSpPr>
-            <a:spLocks noGrp="1"/>
-          </p:cNvSpPr>
+              <a:t>Estimate profit using backend machine model</a:t>
+            </a:r>
+          </a:p>
+        </p:txBody>
+      </p:sp>
+      <p:pic>
+        <p:nvPicPr>
+          <p:cNvPr id="11" name="Content Placeholder 10">
+            <a:extLst>
+              <a:ext uri="{FF2B5EF4-FFF2-40B4-BE49-F238E27FC236}">
+                <a16:creationId xmlns:a16="http://schemas.microsoft.com/office/drawing/2014/main" id="{4381AC4E-8209-4361-B098-39C700E6E44E}"/>
+              </a:ext>
+            </a:extLst>
+          </p:cNvPr>
+          <p:cNvPicPr>
+            <a:picLocks noGrp="1" noChangeAspect="1"/>
+          </p:cNvPicPr>
           <p:nvPr>
             <p:ph idx="1"/>
           </p:nvPr>
-        </p:nvSpPr>
-        <p:spPr/>
-        <p:txBody>
-          <a:bodyPr>
-            <a:normAutofit/>
-          </a:bodyPr>
-          <a:lstStyle/>
-          <a:p>
-            <a:r>
-              <a:rPr lang="en-US" dirty="0"/>
-              <a:t>JavaScript with Flask</a:t>
-            </a:r>
-          </a:p>
-          <a:p>
-            <a:r>
-              <a:rPr lang="en-US" dirty="0"/>
-              <a:t>Visualizations</a:t>
-            </a:r>
-          </a:p>
-          <a:p>
-            <a:pPr lvl="1"/>
-            <a:r>
-              <a:rPr lang="en-US" sz="1800" dirty="0"/>
-              <a:t>D3 </a:t>
-            </a:r>
-          </a:p>
-          <a:p>
-            <a:pPr lvl="1"/>
-            <a:r>
-              <a:rPr lang="en-US" sz="1800" dirty="0" err="1"/>
-              <a:t>Plotly</a:t>
-            </a:r>
-            <a:endParaRPr lang="en-US" sz="1800" dirty="0"/>
-          </a:p>
-          <a:p>
-            <a:pPr lvl="1"/>
-            <a:r>
-              <a:rPr lang="en-US" sz="1800" dirty="0"/>
-              <a:t>Tableau </a:t>
-            </a:r>
-          </a:p>
-          <a:p>
-            <a:r>
-              <a:rPr lang="en-US" dirty="0"/>
-              <a:t>Machine Learning using Linear SVM Model (Pandas)</a:t>
-            </a:r>
-          </a:p>
-          <a:p>
-            <a:r>
-              <a:rPr lang="en-US" dirty="0"/>
-              <a:t>Excel Pivot Tables</a:t>
-            </a:r>
-          </a:p>
-          <a:p>
-            <a:r>
-              <a:rPr lang="en-US" dirty="0"/>
-              <a:t>Hosting Website on Heroku</a:t>
-            </a:r>
-          </a:p>
-        </p:txBody>
-      </p:sp>
+        </p:nvPicPr>
+        <p:blipFill>
+          <a:blip r:embed="rId2">
+            <a:extLst>
+              <a:ext uri="{28A0092B-C50C-407E-A947-70E740481C1C}">
+                <a14:useLocalDpi xmlns:a14="http://schemas.microsoft.com/office/drawing/2010/main" val="0"/>
+              </a:ext>
+            </a:extLst>
+          </a:blip>
+          <a:stretch>
+            <a:fillRect/>
+          </a:stretch>
+        </p:blipFill>
+        <p:spPr>
+          <a:xfrm>
+            <a:off x="2487448" y="2114550"/>
+            <a:ext cx="8009266" cy="3956050"/>
+          </a:xfrm>
+        </p:spPr>
+      </p:pic>
     </p:spTree>
     <p:extLst>
       <p:ext uri="{BB962C8B-B14F-4D97-AF65-F5344CB8AC3E}">
-        <p14:creationId xmlns:p14="http://schemas.microsoft.com/office/powerpoint/2010/main" val="1523120553"/>
+        <p14:creationId xmlns:p14="http://schemas.microsoft.com/office/powerpoint/2010/main" val="3245994239"/>
       </p:ext>
     </p:extLst>
   </p:cSld>
@@ -5542,7 +6193,7 @@
           <p:cNvPr id="2" name="Title 1">
             <a:extLst>
               <a:ext uri="{FF2B5EF4-FFF2-40B4-BE49-F238E27FC236}">
-                <a16:creationId xmlns:a16="http://schemas.microsoft.com/office/drawing/2014/main" id="{AE8BEB1A-C1A9-461D-ABFA-A3637E4F8FF9}"/>
+                <a16:creationId xmlns:a16="http://schemas.microsoft.com/office/drawing/2014/main" id="{BAF500A8-7530-4EF8-A30C-F5403EA0F42A}"/>
               </a:ext>
             </a:extLst>
           </p:cNvPr>
@@ -5560,467 +6211,102 @@
           <a:p>
             <a:r>
               <a:rPr lang="en-US" dirty="0"/>
-              <a:t>Machine learning model</a:t>
-            </a:r>
-          </a:p>
-        </p:txBody>
-      </p:sp>
-      <p:pic>
-        <p:nvPicPr>
-          <p:cNvPr id="8" name="Picture 7">
-            <a:extLst>
-              <a:ext uri="{FF2B5EF4-FFF2-40B4-BE49-F238E27FC236}">
-                <a16:creationId xmlns:a16="http://schemas.microsoft.com/office/drawing/2014/main" id="{C6E65A4F-88F6-4191-9DB7-57B7FF54ED1E}"/>
-              </a:ext>
-            </a:extLst>
-          </p:cNvPr>
-          <p:cNvPicPr>
-            <a:picLocks noChangeAspect="1"/>
-          </p:cNvPicPr>
-          <p:nvPr/>
-        </p:nvPicPr>
-        <p:blipFill>
-          <a:blip r:embed="rId2">
-            <a:extLst>
-              <a:ext uri="{28A0092B-C50C-407E-A947-70E740481C1C}">
-                <a14:useLocalDpi xmlns:a14="http://schemas.microsoft.com/office/drawing/2010/main" val="0"/>
-              </a:ext>
-            </a:extLst>
-          </a:blip>
-          <a:stretch>
-            <a:fillRect/>
-          </a:stretch>
-        </p:blipFill>
-        <p:spPr>
-          <a:xfrm>
-            <a:off x="272072" y="4393539"/>
-            <a:ext cx="4548500" cy="1881401"/>
-          </a:xfrm>
-          <a:prstGeom prst="rect">
-            <a:avLst/>
-          </a:prstGeom>
-        </p:spPr>
-      </p:pic>
-      <p:pic>
-        <p:nvPicPr>
-          <p:cNvPr id="10" name="Picture 9">
-            <a:extLst>
-              <a:ext uri="{FF2B5EF4-FFF2-40B4-BE49-F238E27FC236}">
-                <a16:creationId xmlns:a16="http://schemas.microsoft.com/office/drawing/2014/main" id="{5677A8F7-686E-4789-AABB-EAFD25AAE75C}"/>
-              </a:ext>
-            </a:extLst>
-          </p:cNvPr>
-          <p:cNvPicPr>
-            <a:picLocks noChangeAspect="1"/>
-          </p:cNvPicPr>
-          <p:nvPr/>
-        </p:nvPicPr>
-        <p:blipFill>
-          <a:blip r:embed="rId3">
-            <a:extLst>
-              <a:ext uri="{28A0092B-C50C-407E-A947-70E740481C1C}">
-                <a14:useLocalDpi xmlns:a14="http://schemas.microsoft.com/office/drawing/2010/main" val="0"/>
-              </a:ext>
-            </a:extLst>
-          </a:blip>
-          <a:stretch>
-            <a:fillRect/>
-          </a:stretch>
-        </p:blipFill>
-        <p:spPr>
-          <a:xfrm>
-            <a:off x="292963" y="1890508"/>
-            <a:ext cx="4026650" cy="2386582"/>
-          </a:xfrm>
-          <a:prstGeom prst="rect">
-            <a:avLst/>
-          </a:prstGeom>
-        </p:spPr>
-      </p:pic>
-      <p:pic>
-        <p:nvPicPr>
-          <p:cNvPr id="12" name="Picture 11">
-            <a:extLst>
-              <a:ext uri="{FF2B5EF4-FFF2-40B4-BE49-F238E27FC236}">
-                <a16:creationId xmlns:a16="http://schemas.microsoft.com/office/drawing/2014/main" id="{E26980A9-693B-4126-810F-A10A1E9C3EA6}"/>
-              </a:ext>
-            </a:extLst>
-          </p:cNvPr>
-          <p:cNvPicPr>
-            <a:picLocks noChangeAspect="1"/>
-          </p:cNvPicPr>
-          <p:nvPr/>
-        </p:nvPicPr>
-        <p:blipFill>
-          <a:blip r:embed="rId4">
-            <a:extLst>
-              <a:ext uri="{28A0092B-C50C-407E-A947-70E740481C1C}">
-                <a14:useLocalDpi xmlns:a14="http://schemas.microsoft.com/office/drawing/2010/main" val="0"/>
-              </a:ext>
-            </a:extLst>
-          </a:blip>
-          <a:stretch>
-            <a:fillRect/>
-          </a:stretch>
-        </p:blipFill>
-        <p:spPr>
-          <a:xfrm>
-            <a:off x="5380709" y="4410158"/>
-            <a:ext cx="3300370" cy="769209"/>
-          </a:xfrm>
-          <a:prstGeom prst="rect">
-            <a:avLst/>
-          </a:prstGeom>
-        </p:spPr>
-      </p:pic>
-      <p:pic>
-        <p:nvPicPr>
-          <p:cNvPr id="14" name="Picture 13">
-            <a:extLst>
-              <a:ext uri="{FF2B5EF4-FFF2-40B4-BE49-F238E27FC236}">
-                <a16:creationId xmlns:a16="http://schemas.microsoft.com/office/drawing/2014/main" id="{682A9EBC-7210-49FE-BB0A-CD8972CCFF66}"/>
-              </a:ext>
-            </a:extLst>
-          </p:cNvPr>
-          <p:cNvPicPr>
-            <a:picLocks noChangeAspect="1"/>
-          </p:cNvPicPr>
-          <p:nvPr/>
-        </p:nvPicPr>
-        <p:blipFill>
-          <a:blip r:embed="rId5">
-            <a:extLst>
-              <a:ext uri="{28A0092B-C50C-407E-A947-70E740481C1C}">
-                <a14:useLocalDpi xmlns:a14="http://schemas.microsoft.com/office/drawing/2010/main" val="0"/>
-              </a:ext>
-            </a:extLst>
-          </a:blip>
-          <a:stretch>
-            <a:fillRect/>
-          </a:stretch>
-        </p:blipFill>
-        <p:spPr>
-          <a:xfrm>
-            <a:off x="5380708" y="3373742"/>
-            <a:ext cx="3097326" cy="647699"/>
-          </a:xfrm>
-          <a:prstGeom prst="rect">
-            <a:avLst/>
-          </a:prstGeom>
-        </p:spPr>
-      </p:pic>
-      <p:pic>
-        <p:nvPicPr>
-          <p:cNvPr id="16" name="Picture 15">
-            <a:extLst>
-              <a:ext uri="{FF2B5EF4-FFF2-40B4-BE49-F238E27FC236}">
-                <a16:creationId xmlns:a16="http://schemas.microsoft.com/office/drawing/2014/main" id="{5F8F55EE-3AF4-4144-8385-10AD774F5982}"/>
-              </a:ext>
-            </a:extLst>
-          </p:cNvPr>
-          <p:cNvPicPr>
-            <a:picLocks noChangeAspect="1"/>
-          </p:cNvPicPr>
-          <p:nvPr/>
-        </p:nvPicPr>
-        <p:blipFill>
-          <a:blip r:embed="rId6">
-            <a:extLst>
-              <a:ext uri="{28A0092B-C50C-407E-A947-70E740481C1C}">
-                <a14:useLocalDpi xmlns:a14="http://schemas.microsoft.com/office/drawing/2010/main" val="0"/>
-              </a:ext>
-            </a:extLst>
-          </a:blip>
-          <a:stretch>
-            <a:fillRect/>
-          </a:stretch>
-        </p:blipFill>
-        <p:spPr>
-          <a:xfrm>
-            <a:off x="5313991" y="1918834"/>
-            <a:ext cx="3166929" cy="672309"/>
-          </a:xfrm>
-          <a:prstGeom prst="rect">
-            <a:avLst/>
-          </a:prstGeom>
-        </p:spPr>
-      </p:pic>
-      <p:cxnSp>
-        <p:nvCxnSpPr>
-          <p:cNvPr id="18" name="Straight Connector 17">
-            <a:extLst>
-              <a:ext uri="{FF2B5EF4-FFF2-40B4-BE49-F238E27FC236}">
-                <a16:creationId xmlns:a16="http://schemas.microsoft.com/office/drawing/2014/main" id="{56E6E948-65CB-4F65-848F-77B6075543B1}"/>
-              </a:ext>
-            </a:extLst>
-          </p:cNvPr>
-          <p:cNvCxnSpPr/>
-          <p:nvPr/>
-        </p:nvCxnSpPr>
-        <p:spPr>
-          <a:xfrm>
-            <a:off x="5282208" y="1793289"/>
-            <a:ext cx="0" cy="4346290"/>
-          </a:xfrm>
-          <a:prstGeom prst="line">
-            <a:avLst/>
-          </a:prstGeom>
-        </p:spPr>
-        <p:style>
-          <a:lnRef idx="2">
-            <a:schemeClr val="dk1"/>
-          </a:lnRef>
-          <a:fillRef idx="0">
-            <a:schemeClr val="dk1"/>
-          </a:fillRef>
-          <a:effectRef idx="1">
-            <a:schemeClr val="dk1"/>
-          </a:effectRef>
-          <a:fontRef idx="minor">
-            <a:schemeClr val="tx1"/>
-          </a:fontRef>
-        </p:style>
-      </p:cxnSp>
-      <p:cxnSp>
-        <p:nvCxnSpPr>
-          <p:cNvPr id="20" name="Straight Connector 19">
-            <a:extLst>
-              <a:ext uri="{FF2B5EF4-FFF2-40B4-BE49-F238E27FC236}">
-                <a16:creationId xmlns:a16="http://schemas.microsoft.com/office/drawing/2014/main" id="{A470FAFC-DD74-48A5-A59A-3DE736279C90}"/>
-              </a:ext>
-            </a:extLst>
-          </p:cNvPr>
-          <p:cNvCxnSpPr/>
-          <p:nvPr/>
-        </p:nvCxnSpPr>
-        <p:spPr>
-          <a:xfrm>
-            <a:off x="292963" y="4323425"/>
-            <a:ext cx="11653538" cy="0"/>
-          </a:xfrm>
-          <a:prstGeom prst="line">
-            <a:avLst/>
-          </a:prstGeom>
-        </p:spPr>
-        <p:style>
-          <a:lnRef idx="2">
-            <a:schemeClr val="dk1"/>
-          </a:lnRef>
-          <a:fillRef idx="0">
-            <a:schemeClr val="dk1"/>
-          </a:fillRef>
-          <a:effectRef idx="1">
-            <a:schemeClr val="dk1"/>
-          </a:effectRef>
-          <a:fontRef idx="minor">
-            <a:schemeClr val="tx1"/>
-          </a:fontRef>
-        </p:style>
-      </p:cxnSp>
-      <p:sp>
-        <p:nvSpPr>
-          <p:cNvPr id="21" name="TextBox 20">
-            <a:extLst>
-              <a:ext uri="{FF2B5EF4-FFF2-40B4-BE49-F238E27FC236}">
-                <a16:creationId xmlns:a16="http://schemas.microsoft.com/office/drawing/2014/main" id="{6B6FE201-17E5-4A10-85EC-25A86AE7C3A1}"/>
-              </a:ext>
-            </a:extLst>
-          </p:cNvPr>
-          <p:cNvSpPr txBox="1"/>
-          <p:nvPr/>
-        </p:nvSpPr>
-        <p:spPr>
-          <a:xfrm>
-            <a:off x="5380708" y="5375527"/>
-            <a:ext cx="3300370" cy="378196"/>
-          </a:xfrm>
-          <a:prstGeom prst="rect">
-            <a:avLst/>
-          </a:prstGeom>
-          <a:noFill/>
-        </p:spPr>
-        <p:txBody>
-          <a:bodyPr wrap="square" rtlCol="0">
-            <a:spAutoFit/>
+              <a:t>approach</a:t>
+            </a:r>
+          </a:p>
+        </p:txBody>
+      </p:sp>
+      <p:sp>
+        <p:nvSpPr>
+          <p:cNvPr id="3" name="Content Placeholder 2">
+            <a:extLst>
+              <a:ext uri="{FF2B5EF4-FFF2-40B4-BE49-F238E27FC236}">
+                <a16:creationId xmlns:a16="http://schemas.microsoft.com/office/drawing/2014/main" id="{7F6C3408-8B60-4991-8A50-E21A6DA88B59}"/>
+              </a:ext>
+            </a:extLst>
+          </p:cNvPr>
+          <p:cNvSpPr>
+            <a:spLocks noGrp="1"/>
+          </p:cNvSpPr>
+          <p:nvPr>
+            <p:ph idx="1"/>
+          </p:nvPr>
+        </p:nvSpPr>
+        <p:spPr/>
+        <p:txBody>
+          <a:bodyPr>
+            <a:normAutofit fontScale="92500" lnSpcReduction="10000"/>
           </a:bodyPr>
           <a:lstStyle/>
           <a:p>
             <a:r>
               <a:rPr lang="en-US" dirty="0"/>
-              <a:t>Profit = -13.356 + 17.28 * odds</a:t>
-            </a:r>
-          </a:p>
-        </p:txBody>
-      </p:sp>
-      <p:pic>
-        <p:nvPicPr>
-          <p:cNvPr id="22" name="Picture 21">
-            <a:extLst>
-              <a:ext uri="{FF2B5EF4-FFF2-40B4-BE49-F238E27FC236}">
-                <a16:creationId xmlns:a16="http://schemas.microsoft.com/office/drawing/2014/main" id="{2BBDFF6C-3725-4C4C-BE9B-5C1AEF91F45C}"/>
-              </a:ext>
-            </a:extLst>
-          </p:cNvPr>
-          <p:cNvPicPr>
-            <a:picLocks noChangeAspect="1"/>
-          </p:cNvPicPr>
-          <p:nvPr/>
-        </p:nvPicPr>
-        <p:blipFill>
-          <a:blip r:embed="rId7"/>
-          <a:stretch>
-            <a:fillRect/>
-          </a:stretch>
-        </p:blipFill>
-        <p:spPr>
-          <a:xfrm>
-            <a:off x="8964577" y="1948017"/>
-            <a:ext cx="3097326" cy="1860045"/>
-          </a:xfrm>
-          <a:prstGeom prst="rect">
-            <a:avLst/>
-          </a:prstGeom>
-        </p:spPr>
-      </p:pic>
-      <p:pic>
-        <p:nvPicPr>
-          <p:cNvPr id="7" name="Picture 6">
-            <a:extLst>
-              <a:ext uri="{FF2B5EF4-FFF2-40B4-BE49-F238E27FC236}">
-                <a16:creationId xmlns:a16="http://schemas.microsoft.com/office/drawing/2014/main" id="{6B80F0FB-64F2-4E12-B108-4B77315EC6D1}"/>
-              </a:ext>
-            </a:extLst>
-          </p:cNvPr>
-          <p:cNvPicPr>
-            <a:picLocks noChangeAspect="1"/>
-          </p:cNvPicPr>
-          <p:nvPr/>
-        </p:nvPicPr>
-        <p:blipFill>
-          <a:blip r:embed="rId8">
-            <a:extLst>
-              <a:ext uri="{28A0092B-C50C-407E-A947-70E740481C1C}">
-                <a14:useLocalDpi xmlns:a14="http://schemas.microsoft.com/office/drawing/2010/main" val="0"/>
-              </a:ext>
-            </a:extLst>
-          </a:blip>
-          <a:stretch>
-            <a:fillRect/>
-          </a:stretch>
-        </p:blipFill>
-        <p:spPr>
-          <a:xfrm>
-            <a:off x="9924760" y="4344421"/>
-            <a:ext cx="1648879" cy="1930519"/>
-          </a:xfrm>
-          <a:prstGeom prst="rect">
-            <a:avLst/>
-          </a:prstGeom>
-        </p:spPr>
-      </p:pic>
-      <p:sp>
-        <p:nvSpPr>
-          <p:cNvPr id="3" name="TextBox 2">
-            <a:extLst>
-              <a:ext uri="{FF2B5EF4-FFF2-40B4-BE49-F238E27FC236}">
-                <a16:creationId xmlns:a16="http://schemas.microsoft.com/office/drawing/2014/main" id="{33923938-2059-4DFD-9234-52C818B49F41}"/>
-              </a:ext>
-            </a:extLst>
-          </p:cNvPr>
-          <p:cNvSpPr txBox="1"/>
-          <p:nvPr/>
-        </p:nvSpPr>
-        <p:spPr>
-          <a:xfrm>
-            <a:off x="5477879" y="5770247"/>
-            <a:ext cx="3106027" cy="369332"/>
-          </a:xfrm>
-          <a:prstGeom prst="rect">
-            <a:avLst/>
-          </a:prstGeom>
-          <a:noFill/>
-          <a:ln w="19050">
-            <a:solidFill>
-              <a:schemeClr val="tx1"/>
-            </a:solidFill>
-          </a:ln>
-          <a:effectLst>
-            <a:outerShdw blurRad="50800" dist="38100" dir="2700000" algn="tl" rotWithShape="0">
-              <a:prstClr val="black">
-                <a:alpha val="40000"/>
-              </a:prstClr>
-            </a:outerShdw>
-          </a:effectLst>
-        </p:spPr>
-        <p:txBody>
-          <a:bodyPr wrap="square" rtlCol="0">
-            <a:spAutoFit/>
-          </a:bodyPr>
-          <a:lstStyle/>
+              <a:t>JavaScript with Flask</a:t>
+            </a:r>
+          </a:p>
           <a:p>
             <a:r>
               <a:rPr lang="en-US" dirty="0"/>
-              <a:t>Regression Analysis and Testing</a:t>
-            </a:r>
-          </a:p>
-        </p:txBody>
-      </p:sp>
-      <p:sp>
-        <p:nvSpPr>
-          <p:cNvPr id="4" name="Rectangle 3">
-            <a:extLst>
-              <a:ext uri="{FF2B5EF4-FFF2-40B4-BE49-F238E27FC236}">
-                <a16:creationId xmlns:a16="http://schemas.microsoft.com/office/drawing/2014/main" id="{B6D6D843-5A06-489A-8D67-14DD0FD04BE0}"/>
-              </a:ext>
-            </a:extLst>
-          </p:cNvPr>
-          <p:cNvSpPr/>
-          <p:nvPr/>
-        </p:nvSpPr>
-        <p:spPr>
-          <a:xfrm>
-            <a:off x="5282208" y="4323425"/>
-            <a:ext cx="6779693" cy="2014770"/>
-          </a:xfrm>
-          <a:prstGeom prst="rect">
-            <a:avLst/>
-          </a:prstGeom>
-          <a:noFill/>
-          <a:ln w="28575">
-            <a:solidFill>
-              <a:schemeClr val="tx1"/>
-            </a:solidFill>
-          </a:ln>
-        </p:spPr>
-        <p:style>
-          <a:lnRef idx="2">
-            <a:schemeClr val="accent1">
-              <a:shade val="50000"/>
-            </a:schemeClr>
-          </a:lnRef>
-          <a:fillRef idx="1">
-            <a:schemeClr val="accent1"/>
-          </a:fillRef>
-          <a:effectRef idx="0">
-            <a:schemeClr val="accent1"/>
-          </a:effectRef>
-          <a:fontRef idx="minor">
-            <a:schemeClr val="lt1"/>
-          </a:fontRef>
-        </p:style>
-        <p:txBody>
-          <a:bodyPr rtlCol="0" anchor="ctr"/>
-          <a:lstStyle/>
-          <a:p>
-            <a:pPr algn="ctr"/>
-            <a:endParaRPr lang="en-US"/>
+              <a:t>Visualizations</a:t>
+            </a:r>
+          </a:p>
+          <a:p>
+            <a:pPr lvl="1"/>
+            <a:r>
+              <a:rPr lang="en-US" sz="1800" dirty="0"/>
+              <a:t>D3 </a:t>
+            </a:r>
+          </a:p>
+          <a:p>
+            <a:pPr lvl="1"/>
+            <a:r>
+              <a:rPr lang="en-US" sz="1800" dirty="0"/>
+              <a:t>JavaScript </a:t>
+            </a:r>
+            <a:r>
+              <a:rPr lang="en-US" sz="1800" dirty="0" err="1"/>
+              <a:t>Plotly</a:t>
+            </a:r>
+            <a:endParaRPr lang="en-US" sz="1800" dirty="0"/>
+          </a:p>
+          <a:p>
+            <a:pPr lvl="1"/>
+            <a:r>
+              <a:rPr lang="en-US" sz="1800" dirty="0"/>
+              <a:t>Tableau </a:t>
+            </a:r>
+          </a:p>
+          <a:p>
+            <a:r>
+              <a:rPr lang="en-US" dirty="0"/>
+              <a:t>Machine Learning using Linear SVM Model (Pandas)</a:t>
+            </a:r>
+          </a:p>
+          <a:p>
+            <a:pPr lvl="1"/>
+            <a:r>
+              <a:rPr lang="en-US" sz="1800" dirty="0"/>
+              <a:t>Scikit-Learn</a:t>
+            </a:r>
+          </a:p>
+          <a:p>
+            <a:r>
+              <a:rPr lang="en-US" dirty="0"/>
+              <a:t>Excel Pivot Tables</a:t>
+            </a:r>
+          </a:p>
+          <a:p>
+            <a:r>
+              <a:rPr lang="en-US" dirty="0"/>
+              <a:t>Hosting Website on Heroku</a:t>
+            </a:r>
           </a:p>
         </p:txBody>
       </p:sp>
     </p:spTree>
     <p:extLst>
       <p:ext uri="{BB962C8B-B14F-4D97-AF65-F5344CB8AC3E}">
-        <p14:creationId xmlns:p14="http://schemas.microsoft.com/office/powerpoint/2010/main" val="3035487685"/>
+        <p14:creationId xmlns:p14="http://schemas.microsoft.com/office/powerpoint/2010/main" val="1523120553"/>
       </p:ext>
     </p:extLst>
   </p:cSld>
@@ -6052,7 +6338,7 @@
           <p:cNvPr id="2" name="Title 1">
             <a:extLst>
               <a:ext uri="{FF2B5EF4-FFF2-40B4-BE49-F238E27FC236}">
-                <a16:creationId xmlns:a16="http://schemas.microsoft.com/office/drawing/2014/main" id="{7183E5D8-FDAE-4B38-A4AD-95A29CACD584}"/>
+                <a16:creationId xmlns:a16="http://schemas.microsoft.com/office/drawing/2014/main" id="{AE8BEB1A-C1A9-461D-ABFA-A3637E4F8FF9}"/>
               </a:ext>
             </a:extLst>
           </p:cNvPr>
@@ -6065,33 +6351,29 @@
         </p:nvSpPr>
         <p:spPr/>
         <p:txBody>
-          <a:bodyPr>
-            <a:normAutofit fontScale="90000"/>
-          </a:bodyPr>
+          <a:bodyPr/>
           <a:lstStyle/>
           <a:p>
             <a:r>
               <a:rPr lang="en-US" dirty="0"/>
-              <a:t>Higher chance of winning with the best odds</a:t>
+              <a:t>Machine learning model</a:t>
             </a:r>
           </a:p>
         </p:txBody>
       </p:sp>
       <p:pic>
         <p:nvPicPr>
-          <p:cNvPr id="8" name="Content Placeholder 7">
-            <a:extLst>
-              <a:ext uri="{FF2B5EF4-FFF2-40B4-BE49-F238E27FC236}">
-                <a16:creationId xmlns:a16="http://schemas.microsoft.com/office/drawing/2014/main" id="{E7087F08-AF7B-43AF-AF8A-479DCA10D417}"/>
+          <p:cNvPr id="8" name="Picture 7">
+            <a:extLst>
+              <a:ext uri="{FF2B5EF4-FFF2-40B4-BE49-F238E27FC236}">
+                <a16:creationId xmlns:a16="http://schemas.microsoft.com/office/drawing/2014/main" id="{C6E65A4F-88F6-4191-9DB7-57B7FF54ED1E}"/>
               </a:ext>
             </a:extLst>
           </p:cNvPr>
           <p:cNvPicPr>
-            <a:picLocks noGrp="1" noChangeAspect="1"/>
+            <a:picLocks noChangeAspect="1"/>
           </p:cNvPicPr>
-          <p:nvPr>
-            <p:ph idx="1"/>
-          </p:nvPr>
+          <p:nvPr/>
         </p:nvPicPr>
         <p:blipFill>
           <a:blip r:embed="rId2">
@@ -6107,57 +6389,236 @@
         </p:blipFill>
         <p:spPr>
           <a:xfrm>
-            <a:off x="5250993" y="1711732"/>
-            <a:ext cx="6851172" cy="3258797"/>
-          </a:xfrm>
+            <a:off x="272072" y="4393539"/>
+            <a:ext cx="4548500" cy="1881401"/>
+          </a:xfrm>
+          <a:prstGeom prst="rect">
+            <a:avLst/>
+          </a:prstGeom>
         </p:spPr>
       </p:pic>
-      <p:sp>
-        <p:nvSpPr>
-          <p:cNvPr id="4" name="Text Placeholder 3">
-            <a:extLst>
-              <a:ext uri="{FF2B5EF4-FFF2-40B4-BE49-F238E27FC236}">
-                <a16:creationId xmlns:a16="http://schemas.microsoft.com/office/drawing/2014/main" id="{752EE344-0827-4504-980B-5683ECD7F322}"/>
-              </a:ext>
-            </a:extLst>
-          </p:cNvPr>
-          <p:cNvSpPr>
-            <a:spLocks noGrp="1"/>
-          </p:cNvSpPr>
-          <p:nvPr>
-            <p:ph type="body" sz="half" idx="2"/>
-          </p:nvPr>
-        </p:nvSpPr>
-        <p:spPr/>
-        <p:txBody>
-          <a:bodyPr/>
-          <a:lstStyle/>
-          <a:p>
-            <a:r>
-              <a:rPr lang="en-US" dirty="0"/>
-              <a:t>Data shows a 53% chance of winning with odds in the 1 to 2 range.</a:t>
-            </a:r>
-          </a:p>
-          <a:p>
-            <a:r>
-              <a:rPr lang="en-US" dirty="0"/>
-              <a:t>Gamblers won 36% of the time when betting on odds within 2 to 3.</a:t>
-            </a:r>
-          </a:p>
-          <a:p>
-            <a:r>
-              <a:rPr lang="en-US" dirty="0"/>
-              <a:t>As expected, the observed probability of winning drops down significantly as the betting odds get higher.</a:t>
-            </a:r>
-          </a:p>
-        </p:txBody>
-      </p:sp>
-      <p:sp>
-        <p:nvSpPr>
-          <p:cNvPr id="6" name="TextBox 5">
-            <a:extLst>
-              <a:ext uri="{FF2B5EF4-FFF2-40B4-BE49-F238E27FC236}">
-                <a16:creationId xmlns:a16="http://schemas.microsoft.com/office/drawing/2014/main" id="{D7125DFA-2E4D-4BC5-8A05-1A7ABC710123}"/>
+      <p:pic>
+        <p:nvPicPr>
+          <p:cNvPr id="10" name="Picture 9">
+            <a:extLst>
+              <a:ext uri="{FF2B5EF4-FFF2-40B4-BE49-F238E27FC236}">
+                <a16:creationId xmlns:a16="http://schemas.microsoft.com/office/drawing/2014/main" id="{5677A8F7-686E-4789-AABB-EAFD25AAE75C}"/>
+              </a:ext>
+            </a:extLst>
+          </p:cNvPr>
+          <p:cNvPicPr>
+            <a:picLocks noChangeAspect="1"/>
+          </p:cNvPicPr>
+          <p:nvPr/>
+        </p:nvPicPr>
+        <p:blipFill>
+          <a:blip r:embed="rId3">
+            <a:extLst>
+              <a:ext uri="{28A0092B-C50C-407E-A947-70E740481C1C}">
+                <a14:useLocalDpi xmlns:a14="http://schemas.microsoft.com/office/drawing/2010/main" val="0"/>
+              </a:ext>
+            </a:extLst>
+          </a:blip>
+          <a:stretch>
+            <a:fillRect/>
+          </a:stretch>
+        </p:blipFill>
+        <p:spPr>
+          <a:xfrm>
+            <a:off x="292963" y="1890508"/>
+            <a:ext cx="4026650" cy="2386582"/>
+          </a:xfrm>
+          <a:prstGeom prst="rect">
+            <a:avLst/>
+          </a:prstGeom>
+        </p:spPr>
+      </p:pic>
+      <p:pic>
+        <p:nvPicPr>
+          <p:cNvPr id="12" name="Picture 11">
+            <a:extLst>
+              <a:ext uri="{FF2B5EF4-FFF2-40B4-BE49-F238E27FC236}">
+                <a16:creationId xmlns:a16="http://schemas.microsoft.com/office/drawing/2014/main" id="{E26980A9-693B-4126-810F-A10A1E9C3EA6}"/>
+              </a:ext>
+            </a:extLst>
+          </p:cNvPr>
+          <p:cNvPicPr>
+            <a:picLocks noChangeAspect="1"/>
+          </p:cNvPicPr>
+          <p:nvPr/>
+        </p:nvPicPr>
+        <p:blipFill>
+          <a:blip r:embed="rId4">
+            <a:extLst>
+              <a:ext uri="{28A0092B-C50C-407E-A947-70E740481C1C}">
+                <a14:useLocalDpi xmlns:a14="http://schemas.microsoft.com/office/drawing/2010/main" val="0"/>
+              </a:ext>
+            </a:extLst>
+          </a:blip>
+          <a:stretch>
+            <a:fillRect/>
+          </a:stretch>
+        </p:blipFill>
+        <p:spPr>
+          <a:xfrm>
+            <a:off x="5380709" y="4410158"/>
+            <a:ext cx="3300370" cy="769209"/>
+          </a:xfrm>
+          <a:prstGeom prst="rect">
+            <a:avLst/>
+          </a:prstGeom>
+        </p:spPr>
+      </p:pic>
+      <p:pic>
+        <p:nvPicPr>
+          <p:cNvPr id="14" name="Picture 13">
+            <a:extLst>
+              <a:ext uri="{FF2B5EF4-FFF2-40B4-BE49-F238E27FC236}">
+                <a16:creationId xmlns:a16="http://schemas.microsoft.com/office/drawing/2014/main" id="{682A9EBC-7210-49FE-BB0A-CD8972CCFF66}"/>
+              </a:ext>
+            </a:extLst>
+          </p:cNvPr>
+          <p:cNvPicPr>
+            <a:picLocks noChangeAspect="1"/>
+          </p:cNvPicPr>
+          <p:nvPr/>
+        </p:nvPicPr>
+        <p:blipFill>
+          <a:blip r:embed="rId5">
+            <a:extLst>
+              <a:ext uri="{28A0092B-C50C-407E-A947-70E740481C1C}">
+                <a14:useLocalDpi xmlns:a14="http://schemas.microsoft.com/office/drawing/2010/main" val="0"/>
+              </a:ext>
+            </a:extLst>
+          </a:blip>
+          <a:stretch>
+            <a:fillRect/>
+          </a:stretch>
+        </p:blipFill>
+        <p:spPr>
+          <a:xfrm>
+            <a:off x="5380708" y="3373742"/>
+            <a:ext cx="3097326" cy="647699"/>
+          </a:xfrm>
+          <a:prstGeom prst="rect">
+            <a:avLst/>
+          </a:prstGeom>
+        </p:spPr>
+      </p:pic>
+      <p:pic>
+        <p:nvPicPr>
+          <p:cNvPr id="16" name="Picture 15">
+            <a:extLst>
+              <a:ext uri="{FF2B5EF4-FFF2-40B4-BE49-F238E27FC236}">
+                <a16:creationId xmlns:a16="http://schemas.microsoft.com/office/drawing/2014/main" id="{5F8F55EE-3AF4-4144-8385-10AD774F5982}"/>
+              </a:ext>
+            </a:extLst>
+          </p:cNvPr>
+          <p:cNvPicPr>
+            <a:picLocks noChangeAspect="1"/>
+          </p:cNvPicPr>
+          <p:nvPr/>
+        </p:nvPicPr>
+        <p:blipFill>
+          <a:blip r:embed="rId6">
+            <a:extLst>
+              <a:ext uri="{28A0092B-C50C-407E-A947-70E740481C1C}">
+                <a14:useLocalDpi xmlns:a14="http://schemas.microsoft.com/office/drawing/2010/main" val="0"/>
+              </a:ext>
+            </a:extLst>
+          </a:blip>
+          <a:stretch>
+            <a:fillRect/>
+          </a:stretch>
+        </p:blipFill>
+        <p:spPr>
+          <a:xfrm>
+            <a:off x="5313991" y="1918834"/>
+            <a:ext cx="3166929" cy="672309"/>
+          </a:xfrm>
+          <a:prstGeom prst="rect">
+            <a:avLst/>
+          </a:prstGeom>
+        </p:spPr>
+      </p:pic>
+      <p:cxnSp>
+        <p:nvCxnSpPr>
+          <p:cNvPr id="18" name="Straight Connector 17">
+            <a:extLst>
+              <a:ext uri="{FF2B5EF4-FFF2-40B4-BE49-F238E27FC236}">
+                <a16:creationId xmlns:a16="http://schemas.microsoft.com/office/drawing/2014/main" id="{56E6E948-65CB-4F65-848F-77B6075543B1}"/>
+              </a:ext>
+            </a:extLst>
+          </p:cNvPr>
+          <p:cNvCxnSpPr/>
+          <p:nvPr/>
+        </p:nvCxnSpPr>
+        <p:spPr>
+          <a:xfrm>
+            <a:off x="5282208" y="1793289"/>
+            <a:ext cx="0" cy="4346290"/>
+          </a:xfrm>
+          <a:prstGeom prst="line">
+            <a:avLst/>
+          </a:prstGeom>
+        </p:spPr>
+        <p:style>
+          <a:lnRef idx="2">
+            <a:schemeClr val="dk1"/>
+          </a:lnRef>
+          <a:fillRef idx="0">
+            <a:schemeClr val="dk1"/>
+          </a:fillRef>
+          <a:effectRef idx="1">
+            <a:schemeClr val="dk1"/>
+          </a:effectRef>
+          <a:fontRef idx="minor">
+            <a:schemeClr val="tx1"/>
+          </a:fontRef>
+        </p:style>
+      </p:cxnSp>
+      <p:cxnSp>
+        <p:nvCxnSpPr>
+          <p:cNvPr id="20" name="Straight Connector 19">
+            <a:extLst>
+              <a:ext uri="{FF2B5EF4-FFF2-40B4-BE49-F238E27FC236}">
+                <a16:creationId xmlns:a16="http://schemas.microsoft.com/office/drawing/2014/main" id="{A470FAFC-DD74-48A5-A59A-3DE736279C90}"/>
+              </a:ext>
+            </a:extLst>
+          </p:cNvPr>
+          <p:cNvCxnSpPr/>
+          <p:nvPr/>
+        </p:nvCxnSpPr>
+        <p:spPr>
+          <a:xfrm>
+            <a:off x="292963" y="4323425"/>
+            <a:ext cx="11653538" cy="0"/>
+          </a:xfrm>
+          <a:prstGeom prst="line">
+            <a:avLst/>
+          </a:prstGeom>
+        </p:spPr>
+        <p:style>
+          <a:lnRef idx="2">
+            <a:schemeClr val="dk1"/>
+          </a:lnRef>
+          <a:fillRef idx="0">
+            <a:schemeClr val="dk1"/>
+          </a:fillRef>
+          <a:effectRef idx="1">
+            <a:schemeClr val="dk1"/>
+          </a:effectRef>
+          <a:fontRef idx="minor">
+            <a:schemeClr val="tx1"/>
+          </a:fontRef>
+        </p:style>
+      </p:cxnSp>
+      <p:sp>
+        <p:nvSpPr>
+          <p:cNvPr id="21" name="TextBox 20">
+            <a:extLst>
+              <a:ext uri="{FF2B5EF4-FFF2-40B4-BE49-F238E27FC236}">
+                <a16:creationId xmlns:a16="http://schemas.microsoft.com/office/drawing/2014/main" id="{6B6FE201-17E5-4A10-85EC-25A86AE7C3A1}"/>
               </a:ext>
             </a:extLst>
           </p:cNvPr>
@@ -6166,8 +6627,8 @@
         </p:nvSpPr>
         <p:spPr>
           <a:xfrm>
-            <a:off x="1318755" y="5411168"/>
-            <a:ext cx="9357064" cy="307777"/>
+            <a:off x="5380708" y="5375527"/>
+            <a:ext cx="3300370" cy="378196"/>
           </a:xfrm>
           <a:prstGeom prst="rect">
             <a:avLst/>
@@ -6175,30 +6636,90 @@
           <a:noFill/>
         </p:spPr>
         <p:txBody>
-          <a:bodyPr wrap="square">
+          <a:bodyPr wrap="square" rtlCol="0">
             <a:spAutoFit/>
           </a:bodyPr>
           <a:lstStyle/>
           <a:p>
             <a:r>
-              <a:rPr lang="en-US" sz="1400" dirty="0">
-                <a:hlinkClick r:id="rId3"/>
-              </a:rPr>
-              <a:t>https://public.tableau.com/profile/david.moorman#!/vizhome/HorseRacingOddsBetting/OddsforBestChancetoWin?publish=yes</a:t>
-            </a:r>
-            <a:r>
-              <a:rPr lang="en-US" sz="1400" dirty="0"/>
-              <a:t> </a:t>
-            </a:r>
-          </a:p>
-        </p:txBody>
-      </p:sp>
-      <p:sp>
-        <p:nvSpPr>
-          <p:cNvPr id="5" name="TextBox 4">
-            <a:extLst>
-              <a:ext uri="{FF2B5EF4-FFF2-40B4-BE49-F238E27FC236}">
-                <a16:creationId xmlns:a16="http://schemas.microsoft.com/office/drawing/2014/main" id="{CE0A91DA-6BD1-4444-B593-DA4A474684A0}"/>
+              <a:rPr lang="en-US" dirty="0"/>
+              <a:t>Profit = -13.356 + 17.28 * odds</a:t>
+            </a:r>
+          </a:p>
+        </p:txBody>
+      </p:sp>
+      <p:pic>
+        <p:nvPicPr>
+          <p:cNvPr id="22" name="Picture 21">
+            <a:extLst>
+              <a:ext uri="{FF2B5EF4-FFF2-40B4-BE49-F238E27FC236}">
+                <a16:creationId xmlns:a16="http://schemas.microsoft.com/office/drawing/2014/main" id="{2BBDFF6C-3725-4C4C-BE9B-5C1AEF91F45C}"/>
+              </a:ext>
+            </a:extLst>
+          </p:cNvPr>
+          <p:cNvPicPr>
+            <a:picLocks noChangeAspect="1"/>
+          </p:cNvPicPr>
+          <p:nvPr/>
+        </p:nvPicPr>
+        <p:blipFill>
+          <a:blip r:embed="rId7"/>
+          <a:stretch>
+            <a:fillRect/>
+          </a:stretch>
+        </p:blipFill>
+        <p:spPr>
+          <a:xfrm>
+            <a:off x="8964577" y="1948017"/>
+            <a:ext cx="3097326" cy="1860045"/>
+          </a:xfrm>
+          <a:prstGeom prst="rect">
+            <a:avLst/>
+          </a:prstGeom>
+        </p:spPr>
+      </p:pic>
+      <p:pic>
+        <p:nvPicPr>
+          <p:cNvPr id="7" name="Picture 6">
+            <a:extLst>
+              <a:ext uri="{FF2B5EF4-FFF2-40B4-BE49-F238E27FC236}">
+                <a16:creationId xmlns:a16="http://schemas.microsoft.com/office/drawing/2014/main" id="{6B80F0FB-64F2-4E12-B108-4B77315EC6D1}"/>
+              </a:ext>
+            </a:extLst>
+          </p:cNvPr>
+          <p:cNvPicPr>
+            <a:picLocks noChangeAspect="1"/>
+          </p:cNvPicPr>
+          <p:nvPr/>
+        </p:nvPicPr>
+        <p:blipFill>
+          <a:blip r:embed="rId8">
+            <a:extLst>
+              <a:ext uri="{28A0092B-C50C-407E-A947-70E740481C1C}">
+                <a14:useLocalDpi xmlns:a14="http://schemas.microsoft.com/office/drawing/2010/main" val="0"/>
+              </a:ext>
+            </a:extLst>
+          </a:blip>
+          <a:stretch>
+            <a:fillRect/>
+          </a:stretch>
+        </p:blipFill>
+        <p:spPr>
+          <a:xfrm>
+            <a:off x="9924760" y="4344421"/>
+            <a:ext cx="1648879" cy="1930519"/>
+          </a:xfrm>
+          <a:prstGeom prst="rect">
+            <a:avLst/>
+          </a:prstGeom>
+        </p:spPr>
+      </p:pic>
+      <p:sp>
+        <p:nvSpPr>
+          <p:cNvPr id="3" name="TextBox 2">
+            <a:extLst>
+              <a:ext uri="{FF2B5EF4-FFF2-40B4-BE49-F238E27FC236}">
+                <a16:creationId xmlns:a16="http://schemas.microsoft.com/office/drawing/2014/main" id="{33923938-2059-4DFD-9234-52C818B49F41}"/>
               </a:ext>
             </a:extLst>
           </p:cNvPr>
@@ -6207,13 +6728,25 @@
         </p:nvSpPr>
         <p:spPr>
           <a:xfrm>
-            <a:off x="8007658" y="4834347"/>
-            <a:ext cx="2467992" cy="276999"/>
+            <a:off x="5477879" y="5770247"/>
+            <a:ext cx="3106027" cy="369332"/>
           </a:xfrm>
           <a:prstGeom prst="rect">
             <a:avLst/>
           </a:prstGeom>
           <a:noFill/>
+          <a:ln w="19050">
+            <a:solidFill>
+              <a:schemeClr val="tx1"/>
+            </a:solidFill>
+          </a:ln>
+          <a:effectLst>
+            <a:outerShdw blurRad="50800" dist="38100" dir="2700000" algn="tl" rotWithShape="0">
+              <a:prstClr val="black">
+                <a:alpha val="40000"/>
+              </a:prstClr>
+            </a:outerShdw>
+          </a:effectLst>
         </p:spPr>
         <p:txBody>
           <a:bodyPr wrap="square" rtlCol="0">
@@ -6221,18 +6754,69 @@
           </a:bodyPr>
           <a:lstStyle/>
           <a:p>
+            <a:r>
+              <a:rPr lang="en-US" dirty="0"/>
+              <a:t>Regression Analysis and Testing</a:t>
+            </a:r>
+          </a:p>
+        </p:txBody>
+      </p:sp>
+      <p:sp>
+        <p:nvSpPr>
+          <p:cNvPr id="4" name="Rectangle 3">
+            <a:extLst>
+              <a:ext uri="{FF2B5EF4-FFF2-40B4-BE49-F238E27FC236}">
+                <a16:creationId xmlns:a16="http://schemas.microsoft.com/office/drawing/2014/main" id="{B6D6D843-5A06-489A-8D67-14DD0FD04BE0}"/>
+              </a:ext>
+            </a:extLst>
+          </p:cNvPr>
+          <p:cNvSpPr/>
+          <p:nvPr/>
+        </p:nvSpPr>
+        <p:spPr>
+          <a:xfrm>
+            <a:off x="5282208" y="4323425"/>
+            <a:ext cx="6779693" cy="2014770"/>
+          </a:xfrm>
+          <a:prstGeom prst="rect">
+            <a:avLst/>
+          </a:prstGeom>
+          <a:noFill/>
+          <a:ln w="28575">
+            <a:solidFill>
+              <a:schemeClr val="tx1"/>
+            </a:solidFill>
+          </a:ln>
+        </p:spPr>
+        <p:style>
+          <a:lnRef idx="2">
+            <a:schemeClr val="accent1">
+              <a:shade val="50000"/>
+            </a:schemeClr>
+          </a:lnRef>
+          <a:fillRef idx="1">
+            <a:schemeClr val="accent1"/>
+          </a:fillRef>
+          <a:effectRef idx="0">
+            <a:schemeClr val="accent1"/>
+          </a:effectRef>
+          <a:fontRef idx="minor">
+            <a:schemeClr val="lt1"/>
+          </a:fontRef>
+        </p:style>
+        <p:txBody>
+          <a:bodyPr rtlCol="0" anchor="ctr"/>
+          <a:lstStyle/>
+          <a:p>
             <a:pPr algn="ctr"/>
-            <a:r>
-              <a:rPr lang="en-US" sz="1200" dirty="0"/>
-              <a:t>ODDS RANGE</a:t>
-            </a:r>
+            <a:endParaRPr lang="en-US"/>
           </a:p>
         </p:txBody>
       </p:sp>
     </p:spTree>
     <p:extLst>
       <p:ext uri="{BB962C8B-B14F-4D97-AF65-F5344CB8AC3E}">
-        <p14:creationId xmlns:p14="http://schemas.microsoft.com/office/powerpoint/2010/main" val="1239730019"/>
+        <p14:creationId xmlns:p14="http://schemas.microsoft.com/office/powerpoint/2010/main" val="3035487685"/>
       </p:ext>
     </p:extLst>
   </p:cSld>
@@ -6264,7 +6848,7 @@
           <p:cNvPr id="2" name="Title 1">
             <a:extLst>
               <a:ext uri="{FF2B5EF4-FFF2-40B4-BE49-F238E27FC236}">
-                <a16:creationId xmlns:a16="http://schemas.microsoft.com/office/drawing/2014/main" id="{E3662930-9BBA-45FC-8CAA-101904758C83}"/>
+                <a16:creationId xmlns:a16="http://schemas.microsoft.com/office/drawing/2014/main" id="{7183E5D8-FDAE-4B38-A4AD-95A29CACD584}"/>
               </a:ext>
             </a:extLst>
           </p:cNvPr>
@@ -6284,17 +6868,17 @@
           <a:p>
             <a:r>
               <a:rPr lang="en-US" dirty="0"/>
-              <a:t>Average profit expectation per odds</a:t>
+              <a:t>Higher chance of winning with the best odds</a:t>
             </a:r>
           </a:p>
         </p:txBody>
       </p:sp>
       <p:pic>
         <p:nvPicPr>
-          <p:cNvPr id="6" name="Content Placeholder 5">
-            <a:extLst>
-              <a:ext uri="{FF2B5EF4-FFF2-40B4-BE49-F238E27FC236}">
-                <a16:creationId xmlns:a16="http://schemas.microsoft.com/office/drawing/2014/main" id="{B1ED3869-0B9F-4A59-882D-74E44357D884}"/>
+          <p:cNvPr id="8" name="Content Placeholder 7">
+            <a:extLst>
+              <a:ext uri="{FF2B5EF4-FFF2-40B4-BE49-F238E27FC236}">
+                <a16:creationId xmlns:a16="http://schemas.microsoft.com/office/drawing/2014/main" id="{E7087F08-AF7B-43AF-AF8A-479DCA10D417}"/>
               </a:ext>
             </a:extLst>
           </p:cNvPr>
@@ -6319,8 +6903,8 @@
         </p:blipFill>
         <p:spPr>
           <a:xfrm>
-            <a:off x="5648325" y="1661648"/>
-            <a:ext cx="5707063" cy="3525178"/>
+            <a:off x="5250993" y="1711732"/>
+            <a:ext cx="6851172" cy="3258797"/>
           </a:xfrm>
         </p:spPr>
       </p:pic>
@@ -6329,7 +6913,7 @@
           <p:cNvPr id="4" name="Text Placeholder 3">
             <a:extLst>
               <a:ext uri="{FF2B5EF4-FFF2-40B4-BE49-F238E27FC236}">
-                <a16:creationId xmlns:a16="http://schemas.microsoft.com/office/drawing/2014/main" id="{4A9B8F02-AD08-4361-8963-D05E50F12FB5}"/>
+                <a16:creationId xmlns:a16="http://schemas.microsoft.com/office/drawing/2014/main" id="{752EE344-0827-4504-980B-5683ECD7F322}"/>
               </a:ext>
             </a:extLst>
           </p:cNvPr>
@@ -6347,13 +6931,96 @@
           <a:p>
             <a:r>
               <a:rPr lang="en-US" dirty="0"/>
-              <a:t>Better the odds will typically provide a higher probability of profit.</a:t>
+              <a:t>Data shows a 53% chance of winning with odds in the 1 to 2 range.</a:t>
             </a:r>
           </a:p>
           <a:p>
             <a:r>
               <a:rPr lang="en-US" dirty="0"/>
-              <a:t>Higher profit on average for lower odds, but lower probability of winning</a:t>
+              <a:t>Gamblers won 36% of the time when betting on odds within 2 to 3.</a:t>
+            </a:r>
+          </a:p>
+          <a:p>
+            <a:r>
+              <a:rPr lang="en-US" dirty="0"/>
+              <a:t>As expected, the observed probability of winning drops down significantly as the betting odds get higher.</a:t>
+            </a:r>
+          </a:p>
+        </p:txBody>
+      </p:sp>
+      <p:sp>
+        <p:nvSpPr>
+          <p:cNvPr id="6" name="TextBox 5">
+            <a:extLst>
+              <a:ext uri="{FF2B5EF4-FFF2-40B4-BE49-F238E27FC236}">
+                <a16:creationId xmlns:a16="http://schemas.microsoft.com/office/drawing/2014/main" id="{D7125DFA-2E4D-4BC5-8A05-1A7ABC710123}"/>
+              </a:ext>
+            </a:extLst>
+          </p:cNvPr>
+          <p:cNvSpPr txBox="1"/>
+          <p:nvPr/>
+        </p:nvSpPr>
+        <p:spPr>
+          <a:xfrm>
+            <a:off x="1318755" y="5411168"/>
+            <a:ext cx="9357064" cy="307777"/>
+          </a:xfrm>
+          <a:prstGeom prst="rect">
+            <a:avLst/>
+          </a:prstGeom>
+          <a:noFill/>
+        </p:spPr>
+        <p:txBody>
+          <a:bodyPr wrap="square">
+            <a:spAutoFit/>
+          </a:bodyPr>
+          <a:lstStyle/>
+          <a:p>
+            <a:r>
+              <a:rPr lang="en-US" sz="1400" dirty="0">
+                <a:hlinkClick r:id="rId3"/>
+              </a:rPr>
+              <a:t>https://public.tableau.com/profile/david.moorman#!/vizhome/HorseRacingOddsBetting/OddsforBestChancetoWin?publish=yes</a:t>
+            </a:r>
+            <a:r>
+              <a:rPr lang="en-US" sz="1400" dirty="0"/>
+              <a:t> </a:t>
+            </a:r>
+          </a:p>
+        </p:txBody>
+      </p:sp>
+      <p:sp>
+        <p:nvSpPr>
+          <p:cNvPr id="5" name="TextBox 4">
+            <a:extLst>
+              <a:ext uri="{FF2B5EF4-FFF2-40B4-BE49-F238E27FC236}">
+                <a16:creationId xmlns:a16="http://schemas.microsoft.com/office/drawing/2014/main" id="{CE0A91DA-6BD1-4444-B593-DA4A474684A0}"/>
+              </a:ext>
+            </a:extLst>
+          </p:cNvPr>
+          <p:cNvSpPr txBox="1"/>
+          <p:nvPr/>
+        </p:nvSpPr>
+        <p:spPr>
+          <a:xfrm>
+            <a:off x="8007658" y="4834347"/>
+            <a:ext cx="2467992" cy="276999"/>
+          </a:xfrm>
+          <a:prstGeom prst="rect">
+            <a:avLst/>
+          </a:prstGeom>
+          <a:noFill/>
+        </p:spPr>
+        <p:txBody>
+          <a:bodyPr wrap="square" rtlCol="0">
+            <a:spAutoFit/>
+          </a:bodyPr>
+          <a:lstStyle/>
+          <a:p>
+            <a:pPr algn="ctr"/>
+            <a:r>
+              <a:rPr lang="en-US" sz="1200" dirty="0"/>
+              <a:t>ODDS RANGE</a:t>
             </a:r>
           </a:p>
         </p:txBody>
@@ -6361,7 +7028,7 @@
     </p:spTree>
     <p:extLst>
       <p:ext uri="{BB962C8B-B14F-4D97-AF65-F5344CB8AC3E}">
-        <p14:creationId xmlns:p14="http://schemas.microsoft.com/office/powerpoint/2010/main" val="3241397502"/>
+        <p14:creationId xmlns:p14="http://schemas.microsoft.com/office/powerpoint/2010/main" val="1239730019"/>
       </p:ext>
     </p:extLst>
   </p:cSld>

</xml_diff>